<commit_message>
Modificando aula 9 de Dispositivos Móveis
</commit_message>
<xml_diff>
--- a/Eugenio Mariz de Oliveira Netto/Programação de Aplicativos Mobile II/Aula 9/Introdução à Internet das Coisas na plataforma Arduíno.pptx
+++ b/Eugenio Mariz de Oliveira Netto/Programação de Aplicativos Mobile II/Aula 9/Introdução à Internet das Coisas na plataforma Arduíno.pptx
@@ -21,7 +21,13 @@
     <p:sldId id="270" r:id="rId15"/>
     <p:sldId id="271" r:id="rId16"/>
     <p:sldId id="272" r:id="rId17"/>
-    <p:sldId id="258" r:id="rId18"/>
+    <p:sldId id="273" r:id="rId18"/>
+    <p:sldId id="274" r:id="rId19"/>
+    <p:sldId id="275" r:id="rId20"/>
+    <p:sldId id="276" r:id="rId21"/>
+    <p:sldId id="277" r:id="rId22"/>
+    <p:sldId id="278" r:id="rId23"/>
+    <p:sldId id="258" r:id="rId24"/>
   </p:sldIdLst>
   <p:sldSz cx="12192000" cy="6858000"/>
   <p:notesSz cx="6858000" cy="9144000"/>
@@ -120,6 +126,11 @@
       </a:defRPr>
     </a:lvl9pPr>
   </p:defaultTextStyle>
+  <p:extLst>
+    <p:ext uri="{EFAFB233-063F-42B5-8137-9DF3F51BA10A}">
+      <p15:sldGuideLst xmlns:p15="http://schemas.microsoft.com/office/powerpoint/2012/main"/>
+    </p:ext>
+  </p:extLst>
 </p:presentation>
 </file>
 
@@ -349,7 +360,7 @@
           <a:p>
             <a:fld id="{361B78AA-D4BE-4AF3-A0FB-40AFAED14D60}" type="datetimeFigureOut">
               <a:rPr lang="pt-BR" smtClean="0"/>
-              <a:t>07/05/2024</a:t>
+              <a:t>09/05/2024</a:t>
             </a:fld>
             <a:endParaRPr lang="pt-BR"/>
           </a:p>
@@ -557,7 +568,7 @@
           <a:p>
             <a:fld id="{361B78AA-D4BE-4AF3-A0FB-40AFAED14D60}" type="datetimeFigureOut">
               <a:rPr lang="pt-BR" smtClean="0"/>
-              <a:t>07/05/2024</a:t>
+              <a:t>09/05/2024</a:t>
             </a:fld>
             <a:endParaRPr lang="pt-BR"/>
           </a:p>
@@ -813,7 +824,7 @@
           <a:p>
             <a:fld id="{361B78AA-D4BE-4AF3-A0FB-40AFAED14D60}" type="datetimeFigureOut">
               <a:rPr lang="pt-BR" smtClean="0"/>
-              <a:t>07/05/2024</a:t>
+              <a:t>09/05/2024</a:t>
             </a:fld>
             <a:endParaRPr lang="pt-BR"/>
           </a:p>
@@ -987,7 +998,7 @@
           <a:p>
             <a:fld id="{361B78AA-D4BE-4AF3-A0FB-40AFAED14D60}" type="datetimeFigureOut">
               <a:rPr lang="pt-BR" smtClean="0"/>
-              <a:t>07/05/2024</a:t>
+              <a:t>09/05/2024</a:t>
             </a:fld>
             <a:endParaRPr lang="pt-BR"/>
           </a:p>
@@ -1330,7 +1341,7 @@
           <a:p>
             <a:fld id="{361B78AA-D4BE-4AF3-A0FB-40AFAED14D60}" type="datetimeFigureOut">
               <a:rPr lang="pt-BR" smtClean="0"/>
-              <a:t>07/05/2024</a:t>
+              <a:t>09/05/2024</a:t>
             </a:fld>
             <a:endParaRPr lang="pt-BR"/>
           </a:p>
@@ -1605,7 +1616,7 @@
           <a:p>
             <a:fld id="{361B78AA-D4BE-4AF3-A0FB-40AFAED14D60}" type="datetimeFigureOut">
               <a:rPr lang="pt-BR" smtClean="0"/>
-              <a:t>07/05/2024</a:t>
+              <a:t>09/05/2024</a:t>
             </a:fld>
             <a:endParaRPr lang="pt-BR"/>
           </a:p>
@@ -1984,7 +1995,7 @@
           <a:p>
             <a:fld id="{361B78AA-D4BE-4AF3-A0FB-40AFAED14D60}" type="datetimeFigureOut">
               <a:rPr lang="pt-BR" smtClean="0"/>
-              <a:t>07/05/2024</a:t>
+              <a:t>09/05/2024</a:t>
             </a:fld>
             <a:endParaRPr lang="pt-BR"/>
           </a:p>
@@ -2102,7 +2113,7 @@
           <a:p>
             <a:fld id="{361B78AA-D4BE-4AF3-A0FB-40AFAED14D60}" type="datetimeFigureOut">
               <a:rPr lang="pt-BR" smtClean="0"/>
-              <a:t>07/05/2024</a:t>
+              <a:t>09/05/2024</a:t>
             </a:fld>
             <a:endParaRPr lang="pt-BR"/>
           </a:p>
@@ -2273,7 +2284,7 @@
           <a:p>
             <a:fld id="{361B78AA-D4BE-4AF3-A0FB-40AFAED14D60}" type="datetimeFigureOut">
               <a:rPr lang="pt-BR" smtClean="0"/>
-              <a:t>07/05/2024</a:t>
+              <a:t>09/05/2024</a:t>
             </a:fld>
             <a:endParaRPr lang="pt-BR"/>
           </a:p>
@@ -2627,7 +2638,7 @@
           <a:p>
             <a:fld id="{361B78AA-D4BE-4AF3-A0FB-40AFAED14D60}" type="datetimeFigureOut">
               <a:rPr lang="pt-BR" smtClean="0"/>
-              <a:t>07/05/2024</a:t>
+              <a:t>09/05/2024</a:t>
             </a:fld>
             <a:endParaRPr lang="pt-BR"/>
           </a:p>
@@ -3009,7 +3020,7 @@
           <a:p>
             <a:fld id="{361B78AA-D4BE-4AF3-A0FB-40AFAED14D60}" type="datetimeFigureOut">
               <a:rPr lang="pt-BR" smtClean="0"/>
-              <a:t>07/05/2024</a:t>
+              <a:t>09/05/2024</a:t>
             </a:fld>
             <a:endParaRPr lang="pt-BR"/>
           </a:p>
@@ -3296,7 +3307,7 @@
           <a:p>
             <a:fld id="{361B78AA-D4BE-4AF3-A0FB-40AFAED14D60}" type="datetimeFigureOut">
               <a:rPr lang="pt-BR" smtClean="0"/>
-              <a:t>07/05/2024</a:t>
+              <a:t>09/05/2024</a:t>
             </a:fld>
             <a:endParaRPr lang="pt-BR"/>
           </a:p>
@@ -7115,7 +7126,7 @@
           <p:cNvPr id="2" name="Título 1">
             <a:extLst>
               <a:ext uri="{FF2B5EF4-FFF2-40B4-BE49-F238E27FC236}">
-                <a16:creationId xmlns:a16="http://schemas.microsoft.com/office/drawing/2014/main" id="{B1257B60-B68A-0654-36CB-94C3A3CB1B86}"/>
+                <a16:creationId xmlns:a16="http://schemas.microsoft.com/office/drawing/2014/main" id="{CD16D7E8-0597-AB7F-15B5-0EC88A029324}"/>
               </a:ext>
             </a:extLst>
           </p:cNvPr>
@@ -7126,14 +7137,19 @@
             <p:ph type="title"/>
           </p:nvPr>
         </p:nvSpPr>
-        <p:spPr/>
+        <p:spPr>
+          <a:xfrm>
+            <a:off x="1097280" y="286603"/>
+            <a:ext cx="10607040" cy="1450757"/>
+          </a:xfrm>
+        </p:spPr>
         <p:txBody>
           <a:bodyPr/>
           <a:lstStyle/>
           <a:p>
             <a:r>
               <a:rPr lang="pt-BR" dirty="0"/>
-              <a:t>Referências</a:t>
+              <a:t>Desenvolvimento de aplicações no Arduino</a:t>
             </a:r>
           </a:p>
         </p:txBody>
@@ -7143,7 +7159,7 @@
           <p:cNvPr id="3" name="Espaço Reservado para Conteúdo 2">
             <a:extLst>
               <a:ext uri="{FF2B5EF4-FFF2-40B4-BE49-F238E27FC236}">
-                <a16:creationId xmlns:a16="http://schemas.microsoft.com/office/drawing/2014/main" id="{FABB78F9-F7D1-1D62-4AC2-0305675CA240}"/>
+                <a16:creationId xmlns:a16="http://schemas.microsoft.com/office/drawing/2014/main" id="{9C67E95A-DF96-1473-8711-57BA7E9619B4}"/>
               </a:ext>
             </a:extLst>
           </p:cNvPr>
@@ -7160,61 +7176,1053 @@
           <a:lstStyle/>
           <a:p>
             <a:r>
-              <a:rPr lang="pt-BR" b="1" dirty="0"/>
-              <a:t>O que é Arduíno?</a:t>
-            </a:r>
-            <a:endParaRPr lang="pt-BR" dirty="0"/>
-          </a:p>
-          <a:p>
-            <a:r>
               <a:rPr lang="pt-BR" dirty="0"/>
-              <a:t>https://sites.usp.br/</a:t>
+              <a:t>O Arduino é uma excelente opção, pois o seu baixo custo e facilidade de implementação ganhou popularidade. Pode ser usado para como acender e apagar um LED, ou criar uma automação residencial completa.</a:t>
+            </a:r>
+          </a:p>
+          <a:p>
+            <a:r>
+              <a:rPr lang="pt-BR" dirty="0"/>
+              <a:t>A seguir, veja alguns exemplos do que é possível fazer com o Arduino:</a:t>
+            </a:r>
+          </a:p>
+          <a:p>
+            <a:pPr lvl="1"/>
+            <a:r>
+              <a:rPr lang="pt-BR" dirty="0"/>
+              <a:t>Você pode utilizar um Arduino para transformar seu Celular em um controle remoto;</a:t>
+            </a:r>
+          </a:p>
+          <a:p>
+            <a:pPr lvl="1"/>
+            <a:r>
+              <a:rPr lang="pt-BR" dirty="0"/>
+              <a:t>Você pode criar um medidor de distancia (</a:t>
             </a:r>
             <a:r>
               <a:rPr lang="pt-BR" dirty="0" err="1"/>
-              <a:t>ltsi</a:t>
+              <a:t>Ex</a:t>
             </a:r>
             <a:r>
               <a:rPr lang="pt-BR" dirty="0"/>
-              <a:t>/</a:t>
-            </a:r>
-            <a:r>
-              <a:rPr lang="pt-BR" dirty="0" err="1"/>
-              <a:t>introducao</a:t>
-            </a:r>
+              <a:t>:. Para medir um terreno sem precisar de fita métrica). </a:t>
+            </a:r>
+          </a:p>
+          <a:p>
             <a:r>
               <a:rPr lang="pt-BR" dirty="0"/>
-              <a:t>/#:~:text=O%20Arduino%20%C3%A9%20uma%20plataforma,a%20eletr%C3%B4nica%20b%C3%A1sica%20e%20programa%C3%A7%C3%A3o.</a:t>
-            </a:r>
-            <a:endParaRPr lang="pt-BR" b="1" dirty="0"/>
-          </a:p>
-          <a:p>
-            <a:r>
-              <a:rPr lang="pt-BR" b="1" dirty="0"/>
-              <a:t>O que é Internet das Coisas?</a:t>
-            </a:r>
-          </a:p>
-          <a:p>
+              <a:t>Além da placa e dos sensores, outro elemento importante para o Arduino é o </a:t>
+            </a:r>
+            <a:r>
+              <a:rPr lang="pt-BR" i="1" dirty="0"/>
+              <a:t>software</a:t>
+            </a:r>
             <a:r>
               <a:rPr lang="pt-BR" dirty="0"/>
-              <a:t>https://www.oracle.com/br/internet-of-things/what-is-iot/</a:t>
-            </a:r>
-          </a:p>
-          <a:p>
-            <a:endParaRPr lang="pt-BR" b="1" dirty="0"/>
-          </a:p>
-          <a:p>
-            <a:endParaRPr lang="pt-BR" b="1" dirty="0"/>
-          </a:p>
-          <a:p>
-            <a:endParaRPr lang="pt-BR" b="1" dirty="0"/>
+              <a:t>. </a:t>
+            </a:r>
           </a:p>
         </p:txBody>
       </p:sp>
     </p:spTree>
     <p:extLst>
       <p:ext uri="{BB962C8B-B14F-4D97-AF65-F5344CB8AC3E}">
-        <p14:creationId xmlns:p14="http://schemas.microsoft.com/office/powerpoint/2010/main" val="563046003"/>
+        <p14:creationId xmlns:p14="http://schemas.microsoft.com/office/powerpoint/2010/main" val="200419884"/>
+      </p:ext>
+    </p:extLst>
+  </p:cSld>
+  <p:clrMapOvr>
+    <a:masterClrMapping/>
+  </p:clrMapOvr>
+</p:sld>
+</file>
+
+<file path=ppt/slides/slide18.xml><?xml version="1.0" encoding="utf-8"?>
+<p:sld xmlns:a="http://schemas.openxmlformats.org/drawingml/2006/main" xmlns:r="http://schemas.openxmlformats.org/officeDocument/2006/relationships" xmlns:p="http://schemas.openxmlformats.org/presentationml/2006/main">
+  <p:cSld>
+    <p:spTree>
+      <p:nvGrpSpPr>
+        <p:cNvPr id="1" name=""/>
+        <p:cNvGrpSpPr/>
+        <p:nvPr/>
+      </p:nvGrpSpPr>
+      <p:grpSpPr>
+        <a:xfrm>
+          <a:off x="0" y="0"/>
+          <a:ext cx="0" cy="0"/>
+          <a:chOff x="0" y="0"/>
+          <a:chExt cx="0" cy="0"/>
+        </a:xfrm>
+      </p:grpSpPr>
+      <p:sp>
+        <p:nvSpPr>
+          <p:cNvPr id="2" name="Título 1">
+            <a:extLst>
+              <a:ext uri="{FF2B5EF4-FFF2-40B4-BE49-F238E27FC236}">
+                <a16:creationId xmlns:a16="http://schemas.microsoft.com/office/drawing/2014/main" id="{CD16D7E8-0597-AB7F-15B5-0EC88A029324}"/>
+              </a:ext>
+            </a:extLst>
+          </p:cNvPr>
+          <p:cNvSpPr>
+            <a:spLocks noGrp="1"/>
+          </p:cNvSpPr>
+          <p:nvPr>
+            <p:ph type="title"/>
+          </p:nvPr>
+        </p:nvSpPr>
+        <p:spPr>
+          <a:xfrm>
+            <a:off x="1097280" y="286603"/>
+            <a:ext cx="10607040" cy="1450757"/>
+          </a:xfrm>
+        </p:spPr>
+        <p:txBody>
+          <a:bodyPr/>
+          <a:lstStyle/>
+          <a:p>
+            <a:r>
+              <a:rPr lang="pt-BR" dirty="0"/>
+              <a:t>Desenvolvimento de aplicações no Arduino</a:t>
+            </a:r>
+          </a:p>
+        </p:txBody>
+      </p:sp>
+      <p:sp>
+        <p:nvSpPr>
+          <p:cNvPr id="3" name="Espaço Reservado para Conteúdo 2">
+            <a:extLst>
+              <a:ext uri="{FF2B5EF4-FFF2-40B4-BE49-F238E27FC236}">
+                <a16:creationId xmlns:a16="http://schemas.microsoft.com/office/drawing/2014/main" id="{9C67E95A-DF96-1473-8711-57BA7E9619B4}"/>
+              </a:ext>
+            </a:extLst>
+          </p:cNvPr>
+          <p:cNvSpPr>
+            <a:spLocks noGrp="1"/>
+          </p:cNvSpPr>
+          <p:nvPr>
+            <p:ph idx="1"/>
+          </p:nvPr>
+        </p:nvSpPr>
+        <p:spPr/>
+        <p:txBody>
+          <a:bodyPr/>
+          <a:lstStyle/>
+          <a:p>
+            <a:r>
+              <a:rPr lang="pt-BR" dirty="0"/>
+              <a:t>Vamos conhecer o código utilizado para acender e apagar um LED e a estrutura de </a:t>
+            </a:r>
+            <a:r>
+              <a:rPr lang="pt-BR" i="1" dirty="0"/>
+              <a:t>hardware</a:t>
+            </a:r>
+            <a:r>
+              <a:rPr lang="pt-BR" dirty="0"/>
+              <a:t> necessária. </a:t>
+            </a:r>
+          </a:p>
+          <a:p>
+            <a:r>
+              <a:rPr lang="pt-BR" dirty="0"/>
+              <a:t>Outros itens necessários são:</a:t>
+            </a:r>
+          </a:p>
+          <a:p>
+            <a:pPr lvl="1"/>
+            <a:r>
+              <a:rPr lang="pt-BR" dirty="0"/>
+              <a:t>1 LED;</a:t>
+            </a:r>
+          </a:p>
+          <a:p>
+            <a:pPr lvl="1"/>
+            <a:r>
+              <a:rPr lang="pt-BR" dirty="0"/>
+              <a:t>1 Resistor de 200 ohms (ou 120 ohms a depender do LED);</a:t>
+            </a:r>
+          </a:p>
+          <a:p>
+            <a:pPr lvl="1"/>
+            <a:r>
+              <a:rPr lang="pt-BR" dirty="0"/>
+              <a:t>1 </a:t>
+            </a:r>
+            <a:r>
+              <a:rPr lang="pt-BR" i="1" dirty="0"/>
+              <a:t>Protoboard;</a:t>
+            </a:r>
+            <a:endParaRPr lang="pt-BR" dirty="0"/>
+          </a:p>
+          <a:p>
+            <a:endParaRPr lang="pt-BR" dirty="0"/>
+          </a:p>
+        </p:txBody>
+      </p:sp>
+    </p:spTree>
+    <p:extLst>
+      <p:ext uri="{BB962C8B-B14F-4D97-AF65-F5344CB8AC3E}">
+        <p14:creationId xmlns:p14="http://schemas.microsoft.com/office/powerpoint/2010/main" val="4014289042"/>
+      </p:ext>
+    </p:extLst>
+  </p:cSld>
+  <p:clrMapOvr>
+    <a:masterClrMapping/>
+  </p:clrMapOvr>
+</p:sld>
+</file>
+
+<file path=ppt/slides/slide19.xml><?xml version="1.0" encoding="utf-8"?>
+<p:sld xmlns:a="http://schemas.openxmlformats.org/drawingml/2006/main" xmlns:r="http://schemas.openxmlformats.org/officeDocument/2006/relationships" xmlns:p="http://schemas.openxmlformats.org/presentationml/2006/main">
+  <p:cSld>
+    <p:spTree>
+      <p:nvGrpSpPr>
+        <p:cNvPr id="1" name=""/>
+        <p:cNvGrpSpPr/>
+        <p:nvPr/>
+      </p:nvGrpSpPr>
+      <p:grpSpPr>
+        <a:xfrm>
+          <a:off x="0" y="0"/>
+          <a:ext cx="0" cy="0"/>
+          <a:chOff x="0" y="0"/>
+          <a:chExt cx="0" cy="0"/>
+        </a:xfrm>
+      </p:grpSpPr>
+      <p:sp>
+        <p:nvSpPr>
+          <p:cNvPr id="2" name="Título 1">
+            <a:extLst>
+              <a:ext uri="{FF2B5EF4-FFF2-40B4-BE49-F238E27FC236}">
+                <a16:creationId xmlns:a16="http://schemas.microsoft.com/office/drawing/2014/main" id="{CD16D7E8-0597-AB7F-15B5-0EC88A029324}"/>
+              </a:ext>
+            </a:extLst>
+          </p:cNvPr>
+          <p:cNvSpPr>
+            <a:spLocks noGrp="1"/>
+          </p:cNvSpPr>
+          <p:nvPr>
+            <p:ph type="title"/>
+          </p:nvPr>
+        </p:nvSpPr>
+        <p:spPr>
+          <a:xfrm>
+            <a:off x="1097280" y="286603"/>
+            <a:ext cx="10607040" cy="1450757"/>
+          </a:xfrm>
+        </p:spPr>
+        <p:txBody>
+          <a:bodyPr/>
+          <a:lstStyle/>
+          <a:p>
+            <a:r>
+              <a:rPr lang="pt-BR" dirty="0"/>
+              <a:t>Desenvolvimento de aplicações no Arduino</a:t>
+            </a:r>
+          </a:p>
+        </p:txBody>
+      </p:sp>
+      <p:sp>
+        <p:nvSpPr>
+          <p:cNvPr id="3" name="Espaço Reservado para Conteúdo 2">
+            <a:extLst>
+              <a:ext uri="{FF2B5EF4-FFF2-40B4-BE49-F238E27FC236}">
+                <a16:creationId xmlns:a16="http://schemas.microsoft.com/office/drawing/2014/main" id="{9C67E95A-DF96-1473-8711-57BA7E9619B4}"/>
+              </a:ext>
+            </a:extLst>
+          </p:cNvPr>
+          <p:cNvSpPr>
+            <a:spLocks noGrp="1"/>
+          </p:cNvSpPr>
+          <p:nvPr>
+            <p:ph idx="1"/>
+          </p:nvPr>
+        </p:nvSpPr>
+        <p:spPr/>
+        <p:txBody>
+          <a:bodyPr/>
+          <a:lstStyle/>
+          <a:p>
+            <a:r>
+              <a:rPr lang="pt-BR" i="1" dirty="0"/>
+              <a:t>Protoboard </a:t>
+            </a:r>
+            <a:r>
+              <a:rPr lang="pt-BR" dirty="0"/>
+              <a:t>é uma placa para prototipação, utilizada para inserir os componentes eletrônicos, sem a necessidade de soldar os componentes, já que ela simula circuitos.</a:t>
+            </a:r>
+          </a:p>
+          <a:p>
+            <a:r>
+              <a:rPr lang="pt-BR" dirty="0"/>
+              <a:t>Veja a imagem abaixo:</a:t>
+            </a:r>
+          </a:p>
+          <a:p>
+            <a:endParaRPr lang="pt-BR" dirty="0"/>
+          </a:p>
+        </p:txBody>
+      </p:sp>
+      <p:grpSp>
+        <p:nvGrpSpPr>
+          <p:cNvPr id="4" name="Group 9036">
+            <a:extLst>
+              <a:ext uri="{FF2B5EF4-FFF2-40B4-BE49-F238E27FC236}">
+                <a16:creationId xmlns:a16="http://schemas.microsoft.com/office/drawing/2014/main" id="{EC2B4AF7-E2D7-C170-18AF-167C158F62FD}"/>
+              </a:ext>
+            </a:extLst>
+          </p:cNvPr>
+          <p:cNvGrpSpPr/>
+          <p:nvPr/>
+        </p:nvGrpSpPr>
+        <p:grpSpPr>
+          <a:xfrm>
+            <a:off x="7754112" y="2659504"/>
+            <a:ext cx="4437888" cy="3686431"/>
+            <a:chOff x="120187" y="147610"/>
+            <a:chExt cx="3205625" cy="2422360"/>
+          </a:xfrm>
+        </p:grpSpPr>
+        <p:sp>
+          <p:nvSpPr>
+            <p:cNvPr id="6" name="Rectangle 703">
+              <a:extLst>
+                <a:ext uri="{FF2B5EF4-FFF2-40B4-BE49-F238E27FC236}">
+                  <a16:creationId xmlns:a16="http://schemas.microsoft.com/office/drawing/2014/main" id="{E5D8183E-F744-133E-A075-A68E4A0B6E93}"/>
+                </a:ext>
+              </a:extLst>
+            </p:cNvPr>
+            <p:cNvSpPr/>
+            <p:nvPr/>
+          </p:nvSpPr>
+          <p:spPr>
+            <a:xfrm>
+              <a:off x="120188" y="2188136"/>
+              <a:ext cx="2342339" cy="374670"/>
+            </a:xfrm>
+            <a:prstGeom prst="rect">
+              <a:avLst/>
+            </a:prstGeom>
+            <a:ln>
+              <a:noFill/>
+            </a:ln>
+          </p:spPr>
+          <p:txBody>
+            <a:bodyPr vert="horz" lIns="0" tIns="0" rIns="0" bIns="0" rtlCol="0">
+              <a:noAutofit/>
+            </a:bodyPr>
+            <a:lstStyle/>
+            <a:p>
+              <a:pPr marL="133350" indent="-6350" algn="l">
+                <a:lnSpc>
+                  <a:spcPct val="107000"/>
+                </a:lnSpc>
+                <a:spcAft>
+                  <a:spcPts val="800"/>
+                </a:spcAft>
+              </a:pPr>
+              <a:r>
+                <a:rPr lang="pt-BR" sz="1400" b="1" kern="100">
+                  <a:solidFill>
+                    <a:srgbClr val="181717"/>
+                  </a:solidFill>
+                  <a:effectLst/>
+                  <a:latin typeface="Calibri" panose="020F0502020204030204" pitchFamily="34" charset="0"/>
+                  <a:ea typeface="Calibri" panose="020F0502020204030204" pitchFamily="34" charset="0"/>
+                </a:rPr>
+                <a:t>Figura</a:t>
+              </a:r>
+              <a:r>
+                <a:rPr lang="pt-BR" sz="1400" b="1" kern="100" spc="-15">
+                  <a:solidFill>
+                    <a:srgbClr val="181717"/>
+                  </a:solidFill>
+                  <a:effectLst/>
+                  <a:latin typeface="Calibri" panose="020F0502020204030204" pitchFamily="34" charset="0"/>
+                  <a:ea typeface="Calibri" panose="020F0502020204030204" pitchFamily="34" charset="0"/>
+                </a:rPr>
+                <a:t> </a:t>
+              </a:r>
+              <a:r>
+                <a:rPr lang="pt-BR" sz="1400" b="1" kern="100">
+                  <a:solidFill>
+                    <a:srgbClr val="181717"/>
+                  </a:solidFill>
+                  <a:effectLst/>
+                  <a:latin typeface="Calibri" panose="020F0502020204030204" pitchFamily="34" charset="0"/>
+                  <a:ea typeface="Calibri" panose="020F0502020204030204" pitchFamily="34" charset="0"/>
+                </a:rPr>
+                <a:t>6.</a:t>
+              </a:r>
+              <a:r>
+                <a:rPr lang="pt-BR" sz="1400" b="1" kern="100" spc="-15">
+                  <a:solidFill>
+                    <a:srgbClr val="181717"/>
+                  </a:solidFill>
+                  <a:effectLst/>
+                  <a:latin typeface="Calibri" panose="020F0502020204030204" pitchFamily="34" charset="0"/>
+                  <a:ea typeface="Calibri" panose="020F0502020204030204" pitchFamily="34" charset="0"/>
+                </a:rPr>
+                <a:t> </a:t>
+              </a:r>
+              <a:endParaRPr lang="pt-BR" sz="1400" kern="100">
+                <a:solidFill>
+                  <a:srgbClr val="181717"/>
+                </a:solidFill>
+                <a:effectLst/>
+                <a:latin typeface="Times New Roman" panose="02020603050405020304" pitchFamily="18" charset="0"/>
+                <a:ea typeface="Times New Roman" panose="02020603050405020304" pitchFamily="18" charset="0"/>
+              </a:endParaRPr>
+            </a:p>
+          </p:txBody>
+        </p:sp>
+        <p:sp>
+          <p:nvSpPr>
+            <p:cNvPr id="7" name="Rectangle 704">
+              <a:extLst>
+                <a:ext uri="{FF2B5EF4-FFF2-40B4-BE49-F238E27FC236}">
+                  <a16:creationId xmlns:a16="http://schemas.microsoft.com/office/drawing/2014/main" id="{E573E997-64A8-43E2-5ADE-8C9B1CF3A75A}"/>
+                </a:ext>
+              </a:extLst>
+            </p:cNvPr>
+            <p:cNvSpPr/>
+            <p:nvPr/>
+          </p:nvSpPr>
+          <p:spPr>
+            <a:xfrm>
+              <a:off x="785910" y="2192098"/>
+              <a:ext cx="2539902" cy="362713"/>
+            </a:xfrm>
+            <a:prstGeom prst="rect">
+              <a:avLst/>
+            </a:prstGeom>
+            <a:ln>
+              <a:noFill/>
+            </a:ln>
+          </p:spPr>
+          <p:txBody>
+            <a:bodyPr vert="horz" lIns="0" tIns="0" rIns="0" bIns="0" rtlCol="0">
+              <a:noAutofit/>
+            </a:bodyPr>
+            <a:lstStyle/>
+            <a:p>
+              <a:pPr marL="133350" indent="-6350" algn="l">
+                <a:lnSpc>
+                  <a:spcPct val="107000"/>
+                </a:lnSpc>
+                <a:spcAft>
+                  <a:spcPts val="800"/>
+                </a:spcAft>
+              </a:pPr>
+              <a:r>
+                <a:rPr lang="pt-BR" sz="1400" i="1" kern="100" dirty="0">
+                  <a:solidFill>
+                    <a:srgbClr val="181717"/>
+                  </a:solidFill>
+                  <a:effectLst/>
+                  <a:latin typeface="Calibri" panose="020F0502020204030204" pitchFamily="34" charset="0"/>
+                  <a:ea typeface="Calibri" panose="020F0502020204030204" pitchFamily="34" charset="0"/>
+                </a:rPr>
+                <a:t>Protoboard</a:t>
+              </a:r>
+              <a:endParaRPr lang="pt-BR" sz="1400" kern="100" dirty="0">
+                <a:solidFill>
+                  <a:srgbClr val="181717"/>
+                </a:solidFill>
+                <a:effectLst/>
+                <a:latin typeface="Times New Roman" panose="02020603050405020304" pitchFamily="18" charset="0"/>
+                <a:ea typeface="Times New Roman" panose="02020603050405020304" pitchFamily="18" charset="0"/>
+              </a:endParaRPr>
+            </a:p>
+          </p:txBody>
+        </p:sp>
+        <p:sp>
+          <p:nvSpPr>
+            <p:cNvPr id="8" name="Rectangle 705">
+              <a:extLst>
+                <a:ext uri="{FF2B5EF4-FFF2-40B4-BE49-F238E27FC236}">
+                  <a16:creationId xmlns:a16="http://schemas.microsoft.com/office/drawing/2014/main" id="{AE58B5CE-A49C-DF48-B8BE-E89A1EB553E7}"/>
+                </a:ext>
+              </a:extLst>
+            </p:cNvPr>
+            <p:cNvSpPr/>
+            <p:nvPr/>
+          </p:nvSpPr>
+          <p:spPr>
+            <a:xfrm>
+              <a:off x="966516" y="2265056"/>
+              <a:ext cx="23512" cy="160127"/>
+            </a:xfrm>
+            <a:prstGeom prst="rect">
+              <a:avLst/>
+            </a:prstGeom>
+            <a:ln>
+              <a:noFill/>
+            </a:ln>
+          </p:spPr>
+          <p:txBody>
+            <a:bodyPr vert="horz" lIns="0" tIns="0" rIns="0" bIns="0" rtlCol="0">
+              <a:noAutofit/>
+            </a:bodyPr>
+            <a:lstStyle/>
+            <a:p>
+              <a:pPr marL="133350" indent="-6350" algn="l">
+                <a:lnSpc>
+                  <a:spcPct val="107000"/>
+                </a:lnSpc>
+                <a:spcAft>
+                  <a:spcPts val="800"/>
+                </a:spcAft>
+              </a:pPr>
+              <a:r>
+                <a:rPr lang="pt-BR" sz="800" kern="100">
+                  <a:solidFill>
+                    <a:srgbClr val="181717"/>
+                  </a:solidFill>
+                  <a:effectLst/>
+                  <a:latin typeface="Calibri" panose="020F0502020204030204" pitchFamily="34" charset="0"/>
+                  <a:ea typeface="Calibri" panose="020F0502020204030204" pitchFamily="34" charset="0"/>
+                </a:rPr>
+                <a:t>.</a:t>
+              </a:r>
+              <a:endParaRPr lang="pt-BR" sz="1000" kern="100">
+                <a:solidFill>
+                  <a:srgbClr val="181717"/>
+                </a:solidFill>
+                <a:effectLst/>
+                <a:latin typeface="Times New Roman" panose="02020603050405020304" pitchFamily="18" charset="0"/>
+                <a:ea typeface="Times New Roman" panose="02020603050405020304" pitchFamily="18" charset="0"/>
+              </a:endParaRPr>
+            </a:p>
+          </p:txBody>
+        </p:sp>
+        <p:sp>
+          <p:nvSpPr>
+            <p:cNvPr id="9" name="Rectangle 706">
+              <a:extLst>
+                <a:ext uri="{FF2B5EF4-FFF2-40B4-BE49-F238E27FC236}">
+                  <a16:creationId xmlns:a16="http://schemas.microsoft.com/office/drawing/2014/main" id="{ECB9A777-E9AF-C520-718A-4CBCA679D93C}"/>
+                </a:ext>
+              </a:extLst>
+            </p:cNvPr>
+            <p:cNvSpPr/>
+            <p:nvPr/>
+          </p:nvSpPr>
+          <p:spPr>
+            <a:xfrm>
+              <a:off x="120187" y="2427731"/>
+              <a:ext cx="776922" cy="142239"/>
+            </a:xfrm>
+            <a:prstGeom prst="rect">
+              <a:avLst/>
+            </a:prstGeom>
+            <a:ln>
+              <a:noFill/>
+            </a:ln>
+          </p:spPr>
+          <p:txBody>
+            <a:bodyPr vert="horz" lIns="0" tIns="0" rIns="0" bIns="0" rtlCol="0">
+              <a:noAutofit/>
+            </a:bodyPr>
+            <a:lstStyle/>
+            <a:p>
+              <a:pPr marL="133350" indent="-6350" algn="l">
+                <a:lnSpc>
+                  <a:spcPct val="107000"/>
+                </a:lnSpc>
+                <a:spcAft>
+                  <a:spcPts val="800"/>
+                </a:spcAft>
+              </a:pPr>
+              <a:r>
+                <a:rPr lang="pt-BR" sz="1100" i="1" kern="100" dirty="0">
+                  <a:solidFill>
+                    <a:srgbClr val="181717"/>
+                  </a:solidFill>
+                  <a:effectLst/>
+                  <a:latin typeface="Calibri" panose="020F0502020204030204" pitchFamily="34" charset="0"/>
+                  <a:ea typeface="Calibri" panose="020F0502020204030204" pitchFamily="34" charset="0"/>
+                </a:rPr>
+                <a:t>Fonte:</a:t>
+              </a:r>
+              <a:endParaRPr lang="pt-BR" sz="1100" kern="100" dirty="0">
+                <a:solidFill>
+                  <a:srgbClr val="181717"/>
+                </a:solidFill>
+                <a:effectLst/>
+                <a:latin typeface="Times New Roman" panose="02020603050405020304" pitchFamily="18" charset="0"/>
+                <a:ea typeface="Times New Roman" panose="02020603050405020304" pitchFamily="18" charset="0"/>
+              </a:endParaRPr>
+            </a:p>
+          </p:txBody>
+        </p:sp>
+        <p:sp>
+          <p:nvSpPr>
+            <p:cNvPr id="10" name="Rectangle 707">
+              <a:extLst>
+                <a:ext uri="{FF2B5EF4-FFF2-40B4-BE49-F238E27FC236}">
+                  <a16:creationId xmlns:a16="http://schemas.microsoft.com/office/drawing/2014/main" id="{A6E7D051-5769-C57C-3216-65F7732B7A9B}"/>
+                </a:ext>
+              </a:extLst>
+            </p:cNvPr>
+            <p:cNvSpPr/>
+            <p:nvPr/>
+          </p:nvSpPr>
+          <p:spPr>
+            <a:xfrm>
+              <a:off x="343770" y="2429331"/>
+              <a:ext cx="2704417" cy="140112"/>
+            </a:xfrm>
+            <a:prstGeom prst="rect">
+              <a:avLst/>
+            </a:prstGeom>
+            <a:ln>
+              <a:noFill/>
+            </a:ln>
+          </p:spPr>
+          <p:txBody>
+            <a:bodyPr vert="horz" lIns="0" tIns="0" rIns="0" bIns="0" rtlCol="0">
+              <a:noAutofit/>
+            </a:bodyPr>
+            <a:lstStyle/>
+            <a:p>
+              <a:pPr marL="133350" indent="-6350">
+                <a:lnSpc>
+                  <a:spcPct val="107000"/>
+                </a:lnSpc>
+                <a:spcAft>
+                  <a:spcPts val="800"/>
+                </a:spcAft>
+              </a:pPr>
+              <a:r>
+                <a:rPr lang="pt-BR" sz="1100" kern="100" spc="-5" dirty="0">
+                  <a:solidFill>
+                    <a:srgbClr val="181717"/>
+                  </a:solidFill>
+                  <a:effectLst/>
+                  <a:latin typeface="Calibri" panose="020F0502020204030204" pitchFamily="34" charset="0"/>
+                  <a:ea typeface="Calibri" panose="020F0502020204030204" pitchFamily="34" charset="0"/>
+                </a:rPr>
+                <a:t> </a:t>
+              </a:r>
+              <a:r>
+                <a:rPr lang="pt-BR" sz="1100" kern="100" dirty="0" err="1">
+                  <a:solidFill>
+                    <a:srgbClr val="181717"/>
+                  </a:solidFill>
+                  <a:effectLst/>
+                  <a:latin typeface="Calibri" panose="020F0502020204030204" pitchFamily="34" charset="0"/>
+                  <a:ea typeface="Calibri" panose="020F0502020204030204" pitchFamily="34" charset="0"/>
+                </a:rPr>
+                <a:t>RaspDuino</a:t>
+              </a:r>
+              <a:r>
+                <a:rPr lang="pt-BR" sz="1100" kern="100" spc="-5" dirty="0">
+                  <a:solidFill>
+                    <a:srgbClr val="181717"/>
+                  </a:solidFill>
+                  <a:effectLst/>
+                  <a:latin typeface="Calibri" panose="020F0502020204030204" pitchFamily="34" charset="0"/>
+                  <a:ea typeface="Calibri" panose="020F0502020204030204" pitchFamily="34" charset="0"/>
+                </a:rPr>
+                <a:t> </a:t>
+              </a:r>
+              <a:r>
+                <a:rPr lang="pt-BR" sz="1100" kern="100" dirty="0">
+                  <a:solidFill>
+                    <a:srgbClr val="181717"/>
+                  </a:solidFill>
+                  <a:effectLst/>
+                  <a:latin typeface="Calibri" panose="020F0502020204030204" pitchFamily="34" charset="0"/>
+                  <a:ea typeface="Calibri" panose="020F0502020204030204" pitchFamily="34" charset="0"/>
+                </a:rPr>
+                <a:t>(2013,</a:t>
+              </a:r>
+              <a:r>
+                <a:rPr lang="pt-BR" sz="1100" kern="100" spc="-5" dirty="0">
+                  <a:solidFill>
+                    <a:srgbClr val="181717"/>
+                  </a:solidFill>
+                  <a:effectLst/>
+                  <a:latin typeface="Calibri" panose="020F0502020204030204" pitchFamily="34" charset="0"/>
+                  <a:ea typeface="Calibri" panose="020F0502020204030204" pitchFamily="34" charset="0"/>
+                </a:rPr>
+                <a:t> </a:t>
+              </a:r>
+              <a:r>
+                <a:rPr lang="pt-BR" sz="1100" kern="100" dirty="0">
+                  <a:solidFill>
+                    <a:srgbClr val="181717"/>
+                  </a:solidFill>
+                  <a:effectLst/>
+                  <a:latin typeface="Calibri" panose="020F0502020204030204" pitchFamily="34" charset="0"/>
+                  <a:ea typeface="Calibri" panose="020F0502020204030204" pitchFamily="34" charset="0"/>
+                </a:rPr>
+                <a:t>documento </a:t>
+              </a:r>
+              <a:r>
+                <a:rPr lang="pt-BR" sz="1100" i="1" kern="100" spc="5" dirty="0">
+                  <a:solidFill>
+                    <a:srgbClr val="181717"/>
+                  </a:solidFill>
+                  <a:effectLst/>
+                  <a:latin typeface="Calibri" panose="020F0502020204030204" pitchFamily="34" charset="0"/>
+                  <a:ea typeface="Calibri" panose="020F0502020204030204" pitchFamily="34" charset="0"/>
+                </a:rPr>
+                <a:t>on-line)</a:t>
+              </a:r>
+              <a:endParaRPr lang="pt-BR" sz="1100" kern="100" dirty="0">
+                <a:solidFill>
+                  <a:srgbClr val="181717"/>
+                </a:solidFill>
+                <a:effectLst/>
+                <a:latin typeface="Times New Roman" panose="02020603050405020304" pitchFamily="18" charset="0"/>
+                <a:ea typeface="Times New Roman" panose="02020603050405020304" pitchFamily="18" charset="0"/>
+              </a:endParaRPr>
+            </a:p>
+            <a:p>
+              <a:pPr marL="133350" indent="-6350" algn="l">
+                <a:lnSpc>
+                  <a:spcPct val="107000"/>
+                </a:lnSpc>
+                <a:spcAft>
+                  <a:spcPts val="800"/>
+                </a:spcAft>
+              </a:pPr>
+              <a:r>
+                <a:rPr lang="pt-BR" sz="1100" kern="100" spc="-5" dirty="0">
+                  <a:solidFill>
+                    <a:srgbClr val="181717"/>
+                  </a:solidFill>
+                  <a:effectLst/>
+                  <a:latin typeface="Calibri" panose="020F0502020204030204" pitchFamily="34" charset="0"/>
+                  <a:ea typeface="Calibri" panose="020F0502020204030204" pitchFamily="34" charset="0"/>
+                </a:rPr>
+                <a:t> </a:t>
+              </a:r>
+              <a:endParaRPr lang="pt-BR" sz="1100" kern="100" dirty="0">
+                <a:solidFill>
+                  <a:srgbClr val="181717"/>
+                </a:solidFill>
+                <a:effectLst/>
+                <a:latin typeface="Times New Roman" panose="02020603050405020304" pitchFamily="18" charset="0"/>
+                <a:ea typeface="Times New Roman" panose="02020603050405020304" pitchFamily="18" charset="0"/>
+              </a:endParaRPr>
+            </a:p>
+          </p:txBody>
+        </p:sp>
+        <p:sp>
+          <p:nvSpPr>
+            <p:cNvPr id="11" name="Rectangle 708">
+              <a:extLst>
+                <a:ext uri="{FF2B5EF4-FFF2-40B4-BE49-F238E27FC236}">
+                  <a16:creationId xmlns:a16="http://schemas.microsoft.com/office/drawing/2014/main" id="{E89F6C9F-0122-D4C1-2C8B-F406CD66AB75}"/>
+                </a:ext>
+              </a:extLst>
+            </p:cNvPr>
+            <p:cNvSpPr/>
+            <p:nvPr/>
+          </p:nvSpPr>
+          <p:spPr>
+            <a:xfrm>
+              <a:off x="1445393" y="2429509"/>
+              <a:ext cx="321806" cy="139874"/>
+            </a:xfrm>
+            <a:prstGeom prst="rect">
+              <a:avLst/>
+            </a:prstGeom>
+            <a:ln>
+              <a:noFill/>
+            </a:ln>
+          </p:spPr>
+          <p:txBody>
+            <a:bodyPr vert="horz" lIns="0" tIns="0" rIns="0" bIns="0" rtlCol="0">
+              <a:noAutofit/>
+            </a:bodyPr>
+            <a:lstStyle/>
+            <a:p>
+              <a:pPr marL="133350" indent="-6350" algn="l">
+                <a:lnSpc>
+                  <a:spcPct val="107000"/>
+                </a:lnSpc>
+                <a:spcAft>
+                  <a:spcPts val="800"/>
+                </a:spcAft>
+              </a:pPr>
+              <a:endParaRPr lang="pt-BR" sz="1000" kern="100" dirty="0">
+                <a:solidFill>
+                  <a:srgbClr val="181717"/>
+                </a:solidFill>
+                <a:effectLst/>
+                <a:latin typeface="Times New Roman" panose="02020603050405020304" pitchFamily="18" charset="0"/>
+                <a:ea typeface="Times New Roman" panose="02020603050405020304" pitchFamily="18" charset="0"/>
+              </a:endParaRPr>
+            </a:p>
+          </p:txBody>
+        </p:sp>
+        <p:pic>
+          <p:nvPicPr>
+            <p:cNvPr id="13" name="Picture 711">
+              <a:extLst>
+                <a:ext uri="{FF2B5EF4-FFF2-40B4-BE49-F238E27FC236}">
+                  <a16:creationId xmlns:a16="http://schemas.microsoft.com/office/drawing/2014/main" id="{0618FC1A-A8D6-9C45-ECDF-0BAA7E851FC0}"/>
+                </a:ext>
+              </a:extLst>
+            </p:cNvPr>
+            <p:cNvPicPr/>
+            <p:nvPr/>
+          </p:nvPicPr>
+          <p:blipFill>
+            <a:blip r:embed="rId2"/>
+            <a:stretch>
+              <a:fillRect/>
+            </a:stretch>
+          </p:blipFill>
+          <p:spPr>
+            <a:xfrm>
+              <a:off x="129055" y="147610"/>
+              <a:ext cx="2879054" cy="2014293"/>
+            </a:xfrm>
+            <a:prstGeom prst="rect">
+              <a:avLst/>
+            </a:prstGeom>
+          </p:spPr>
+        </p:pic>
+      </p:grpSp>
+      <p:sp>
+        <p:nvSpPr>
+          <p:cNvPr id="14" name="CaixaDeTexto 13">
+            <a:extLst>
+              <a:ext uri="{FF2B5EF4-FFF2-40B4-BE49-F238E27FC236}">
+                <a16:creationId xmlns:a16="http://schemas.microsoft.com/office/drawing/2014/main" id="{AF287452-6742-FBD6-0577-D4EA42BCCCDA}"/>
+              </a:ext>
+            </a:extLst>
+          </p:cNvPr>
+          <p:cNvSpPr txBox="1"/>
+          <p:nvPr/>
+        </p:nvSpPr>
+        <p:spPr>
+          <a:xfrm>
+            <a:off x="1097280" y="3059668"/>
+            <a:ext cx="6669109" cy="2031325"/>
+          </a:xfrm>
+          <a:prstGeom prst="rect">
+            <a:avLst/>
+          </a:prstGeom>
+          <a:noFill/>
+        </p:spPr>
+        <p:txBody>
+          <a:bodyPr wrap="square" rtlCol="0">
+            <a:spAutoFit/>
+          </a:bodyPr>
+          <a:lstStyle/>
+          <a:p>
+            <a:pPr marL="342900" indent="-342900">
+              <a:buAutoNum type="arabicPeriod"/>
+            </a:pPr>
+            <a:r>
+              <a:rPr lang="pt-BR" dirty="0">
+                <a:solidFill>
+                  <a:schemeClr val="tx1">
+                    <a:lumMod val="75000"/>
+                    <a:lumOff val="25000"/>
+                  </a:schemeClr>
+                </a:solidFill>
+              </a:rPr>
+              <a:t>Perceba que a placa tem furos centras representados por </a:t>
+            </a:r>
+            <a:r>
+              <a:rPr lang="pt-BR" b="1" dirty="0">
+                <a:solidFill>
+                  <a:schemeClr val="tx1">
+                    <a:lumMod val="75000"/>
+                    <a:lumOff val="25000"/>
+                  </a:schemeClr>
+                </a:solidFill>
+              </a:rPr>
+              <a:t>A </a:t>
+            </a:r>
+            <a:r>
+              <a:rPr lang="pt-BR" dirty="0">
+                <a:solidFill>
+                  <a:schemeClr val="tx1">
+                    <a:lumMod val="75000"/>
+                    <a:lumOff val="25000"/>
+                  </a:schemeClr>
+                </a:solidFill>
+              </a:rPr>
+              <a:t>até </a:t>
+            </a:r>
+            <a:r>
+              <a:rPr lang="pt-BR" b="1" dirty="0">
+                <a:solidFill>
+                  <a:schemeClr val="tx1">
+                    <a:lumMod val="75000"/>
+                    <a:lumOff val="25000"/>
+                  </a:schemeClr>
+                </a:solidFill>
+              </a:rPr>
+              <a:t>J</a:t>
+            </a:r>
+            <a:r>
+              <a:rPr lang="pt-BR" dirty="0">
+                <a:solidFill>
+                  <a:schemeClr val="tx1">
+                    <a:lumMod val="75000"/>
+                    <a:lumOff val="25000"/>
+                  </a:schemeClr>
+                </a:solidFill>
+              </a:rPr>
+              <a:t>.</a:t>
+            </a:r>
+          </a:p>
+          <a:p>
+            <a:pPr marL="342900" indent="-342900">
+              <a:buAutoNum type="arabicPeriod"/>
+            </a:pPr>
+            <a:r>
+              <a:rPr lang="pt-BR" dirty="0">
+                <a:solidFill>
+                  <a:schemeClr val="tx1">
+                    <a:lumMod val="75000"/>
+                    <a:lumOff val="25000"/>
+                  </a:schemeClr>
+                </a:solidFill>
+              </a:rPr>
+              <a:t>De </a:t>
+            </a:r>
+            <a:r>
+              <a:rPr lang="pt-BR" b="1" dirty="0">
+                <a:solidFill>
+                  <a:schemeClr val="tx1">
+                    <a:lumMod val="75000"/>
+                    <a:lumOff val="25000"/>
+                  </a:schemeClr>
+                </a:solidFill>
+              </a:rPr>
+              <a:t>A </a:t>
+            </a:r>
+            <a:r>
+              <a:rPr lang="pt-BR" dirty="0">
+                <a:solidFill>
+                  <a:schemeClr val="tx1">
+                    <a:lumMod val="75000"/>
+                    <a:lumOff val="25000"/>
+                  </a:schemeClr>
+                </a:solidFill>
+              </a:rPr>
+              <a:t>até </a:t>
+            </a:r>
+            <a:r>
+              <a:rPr lang="pt-BR" b="1" dirty="0">
+                <a:solidFill>
+                  <a:schemeClr val="tx1">
+                    <a:lumMod val="75000"/>
+                    <a:lumOff val="25000"/>
+                  </a:schemeClr>
+                </a:solidFill>
+              </a:rPr>
+              <a:t>E</a:t>
+            </a:r>
+            <a:r>
+              <a:rPr lang="pt-BR" dirty="0">
+                <a:solidFill>
+                  <a:schemeClr val="tx1">
+                    <a:lumMod val="75000"/>
+                    <a:lumOff val="25000"/>
+                  </a:schemeClr>
+                </a:solidFill>
+              </a:rPr>
+              <a:t> (primeira coluna) e </a:t>
+            </a:r>
+            <a:r>
+              <a:rPr lang="pt-BR" b="1" dirty="0">
+                <a:solidFill>
+                  <a:schemeClr val="tx1">
+                    <a:lumMod val="75000"/>
+                    <a:lumOff val="25000"/>
+                  </a:schemeClr>
+                </a:solidFill>
+              </a:rPr>
+              <a:t>F</a:t>
+            </a:r>
+            <a:r>
+              <a:rPr lang="pt-BR" dirty="0">
+                <a:solidFill>
+                  <a:schemeClr val="tx1">
+                    <a:lumMod val="75000"/>
+                    <a:lumOff val="25000"/>
+                  </a:schemeClr>
+                </a:solidFill>
+              </a:rPr>
+              <a:t> e </a:t>
+            </a:r>
+            <a:r>
+              <a:rPr lang="pt-BR" b="1" dirty="0">
+                <a:solidFill>
+                  <a:schemeClr val="tx1">
+                    <a:lumMod val="75000"/>
+                    <a:lumOff val="25000"/>
+                  </a:schemeClr>
+                </a:solidFill>
+              </a:rPr>
+              <a:t>J</a:t>
+            </a:r>
+            <a:r>
+              <a:rPr lang="pt-BR" dirty="0">
+                <a:solidFill>
+                  <a:schemeClr val="tx1">
+                    <a:lumMod val="75000"/>
+                    <a:lumOff val="25000"/>
+                  </a:schemeClr>
+                </a:solidFill>
+              </a:rPr>
+              <a:t> (segunda coluna) são ligadas sem a existência de fio, e a corrente circula entre elas automaticamente (use </a:t>
+            </a:r>
+            <a:r>
+              <a:rPr lang="pt-BR" i="1" dirty="0">
+                <a:solidFill>
+                  <a:schemeClr val="tx1">
+                    <a:lumMod val="75000"/>
+                    <a:lumOff val="25000"/>
+                  </a:schemeClr>
+                </a:solidFill>
+              </a:rPr>
+              <a:t>jumpers</a:t>
+            </a:r>
+            <a:r>
+              <a:rPr lang="pt-BR" dirty="0">
+                <a:solidFill>
+                  <a:schemeClr val="tx1">
+                    <a:lumMod val="75000"/>
+                    <a:lumOff val="25000"/>
+                  </a:schemeClr>
+                </a:solidFill>
+              </a:rPr>
+              <a:t> para ligar uma coluna a outra se necessário).</a:t>
+            </a:r>
+          </a:p>
+          <a:p>
+            <a:pPr marL="342900" indent="-342900">
+              <a:buAutoNum type="arabicPeriod"/>
+            </a:pPr>
+            <a:r>
+              <a:rPr lang="pt-BR" dirty="0">
+                <a:solidFill>
+                  <a:schemeClr val="tx1">
+                    <a:lumMod val="75000"/>
+                    <a:lumOff val="25000"/>
+                  </a:schemeClr>
+                </a:solidFill>
+              </a:rPr>
+              <a:t>Os furos das extremidades são ligados na horizontal como um único fio, mas as linhas não são conectadas entre si.</a:t>
+            </a:r>
+          </a:p>
+        </p:txBody>
+      </p:sp>
+    </p:spTree>
+    <p:extLst>
+      <p:ext uri="{BB962C8B-B14F-4D97-AF65-F5344CB8AC3E}">
+        <p14:creationId xmlns:p14="http://schemas.microsoft.com/office/powerpoint/2010/main" val="2677083103"/>
       </p:ext>
     </p:extLst>
   </p:cSld>
@@ -7355,6 +8363,1189 @@
     <p:extLst>
       <p:ext uri="{BB962C8B-B14F-4D97-AF65-F5344CB8AC3E}">
         <p14:creationId xmlns:p14="http://schemas.microsoft.com/office/powerpoint/2010/main" val="1296170827"/>
+      </p:ext>
+    </p:extLst>
+  </p:cSld>
+  <p:clrMapOvr>
+    <a:masterClrMapping/>
+  </p:clrMapOvr>
+</p:sld>
+</file>
+
+<file path=ppt/slides/slide20.xml><?xml version="1.0" encoding="utf-8"?>
+<p:sld xmlns:a="http://schemas.openxmlformats.org/drawingml/2006/main" xmlns:r="http://schemas.openxmlformats.org/officeDocument/2006/relationships" xmlns:p="http://schemas.openxmlformats.org/presentationml/2006/main">
+  <p:cSld>
+    <p:spTree>
+      <p:nvGrpSpPr>
+        <p:cNvPr id="1" name=""/>
+        <p:cNvGrpSpPr/>
+        <p:nvPr/>
+      </p:nvGrpSpPr>
+      <p:grpSpPr>
+        <a:xfrm>
+          <a:off x="0" y="0"/>
+          <a:ext cx="0" cy="0"/>
+          <a:chOff x="0" y="0"/>
+          <a:chExt cx="0" cy="0"/>
+        </a:xfrm>
+      </p:grpSpPr>
+      <p:sp>
+        <p:nvSpPr>
+          <p:cNvPr id="3" name="Espaço Reservado para Conteúdo 2">
+            <a:extLst>
+              <a:ext uri="{FF2B5EF4-FFF2-40B4-BE49-F238E27FC236}">
+                <a16:creationId xmlns:a16="http://schemas.microsoft.com/office/drawing/2014/main" id="{E25B33BC-87F9-76F1-4788-B847CF9719AF}"/>
+              </a:ext>
+            </a:extLst>
+          </p:cNvPr>
+          <p:cNvSpPr>
+            <a:spLocks noGrp="1"/>
+          </p:cNvSpPr>
+          <p:nvPr>
+            <p:ph idx="1"/>
+          </p:nvPr>
+        </p:nvSpPr>
+        <p:spPr/>
+        <p:txBody>
+          <a:bodyPr/>
+          <a:lstStyle/>
+          <a:p>
+            <a:r>
+              <a:rPr lang="pt-BR" dirty="0"/>
+              <a:t>LEDs (</a:t>
+            </a:r>
+            <a:r>
+              <a:rPr lang="pt-BR" i="1" dirty="0"/>
+              <a:t>light emissor </a:t>
+            </a:r>
+            <a:r>
+              <a:rPr lang="pt-BR" i="1" dirty="0" err="1"/>
+              <a:t>diode</a:t>
+            </a:r>
+            <a:r>
+              <a:rPr lang="pt-BR" dirty="0"/>
+              <a:t>) são componentes que convertem a energia elétrica em energia luminosa.</a:t>
+            </a:r>
+          </a:p>
+          <a:p>
+            <a:r>
+              <a:rPr lang="pt-BR" dirty="0"/>
+              <a:t>A energia fui em apenas um sentido, e ao colocar o componente na placa, devemos conectar a entrada de energia no positivo, e o terra no lado negativo. </a:t>
+            </a:r>
+          </a:p>
+          <a:p>
+            <a:r>
+              <a:rPr lang="pt-BR" dirty="0"/>
+              <a:t>Lembre-se que, em nosso componente, a ponta maior será ligada no positivo, enquanto o negativo receberá o lado do circuito fechado.</a:t>
+            </a:r>
+          </a:p>
+          <a:p>
+            <a:endParaRPr lang="pt-BR" dirty="0"/>
+          </a:p>
+        </p:txBody>
+      </p:sp>
+      <p:sp>
+        <p:nvSpPr>
+          <p:cNvPr id="4" name="Título 1">
+            <a:extLst>
+              <a:ext uri="{FF2B5EF4-FFF2-40B4-BE49-F238E27FC236}">
+                <a16:creationId xmlns:a16="http://schemas.microsoft.com/office/drawing/2014/main" id="{D1E8ADD6-B20F-3A8D-8702-99075F5E55C6}"/>
+              </a:ext>
+            </a:extLst>
+          </p:cNvPr>
+          <p:cNvSpPr>
+            <a:spLocks noGrp="1"/>
+          </p:cNvSpPr>
+          <p:nvPr>
+            <p:ph type="title"/>
+          </p:nvPr>
+        </p:nvSpPr>
+        <p:spPr>
+          <a:xfrm>
+            <a:off x="1097280" y="286603"/>
+            <a:ext cx="10607040" cy="1450757"/>
+          </a:xfrm>
+        </p:spPr>
+        <p:txBody>
+          <a:bodyPr/>
+          <a:lstStyle/>
+          <a:p>
+            <a:r>
+              <a:rPr lang="pt-BR" dirty="0"/>
+              <a:t>Desenvolvimento de aplicações no Arduino</a:t>
+            </a:r>
+          </a:p>
+        </p:txBody>
+      </p:sp>
+    </p:spTree>
+    <p:extLst>
+      <p:ext uri="{BB962C8B-B14F-4D97-AF65-F5344CB8AC3E}">
+        <p14:creationId xmlns:p14="http://schemas.microsoft.com/office/powerpoint/2010/main" val="2908842480"/>
+      </p:ext>
+    </p:extLst>
+  </p:cSld>
+  <p:clrMapOvr>
+    <a:masterClrMapping/>
+  </p:clrMapOvr>
+</p:sld>
+</file>
+
+<file path=ppt/slides/slide21.xml><?xml version="1.0" encoding="utf-8"?>
+<p:sld xmlns:a="http://schemas.openxmlformats.org/drawingml/2006/main" xmlns:r="http://schemas.openxmlformats.org/officeDocument/2006/relationships" xmlns:p="http://schemas.openxmlformats.org/presentationml/2006/main">
+  <p:cSld>
+    <p:spTree>
+      <p:nvGrpSpPr>
+        <p:cNvPr id="1" name=""/>
+        <p:cNvGrpSpPr/>
+        <p:nvPr/>
+      </p:nvGrpSpPr>
+      <p:grpSpPr>
+        <a:xfrm>
+          <a:off x="0" y="0"/>
+          <a:ext cx="0" cy="0"/>
+          <a:chOff x="0" y="0"/>
+          <a:chExt cx="0" cy="0"/>
+        </a:xfrm>
+      </p:grpSpPr>
+      <p:sp>
+        <p:nvSpPr>
+          <p:cNvPr id="3" name="Espaço Reservado para Conteúdo 2">
+            <a:extLst>
+              <a:ext uri="{FF2B5EF4-FFF2-40B4-BE49-F238E27FC236}">
+                <a16:creationId xmlns:a16="http://schemas.microsoft.com/office/drawing/2014/main" id="{E25B33BC-87F9-76F1-4788-B847CF9719AF}"/>
+              </a:ext>
+            </a:extLst>
+          </p:cNvPr>
+          <p:cNvSpPr>
+            <a:spLocks noGrp="1"/>
+          </p:cNvSpPr>
+          <p:nvPr>
+            <p:ph idx="1"/>
+          </p:nvPr>
+        </p:nvSpPr>
+        <p:spPr/>
+        <p:txBody>
+          <a:bodyPr/>
+          <a:lstStyle/>
+          <a:p>
+            <a:r>
+              <a:rPr lang="pt-BR" dirty="0"/>
+              <a:t>Os resistores são componentes eletrônicos que controlam e limitam a passagem de corrente pela placa e pelos demais componentes. Ele pode evitar que algum componente, como o LED, queime.</a:t>
+            </a:r>
+          </a:p>
+          <a:p>
+            <a:endParaRPr lang="pt-BR" dirty="0"/>
+          </a:p>
+        </p:txBody>
+      </p:sp>
+      <p:sp>
+        <p:nvSpPr>
+          <p:cNvPr id="4" name="Título 1">
+            <a:extLst>
+              <a:ext uri="{FF2B5EF4-FFF2-40B4-BE49-F238E27FC236}">
+                <a16:creationId xmlns:a16="http://schemas.microsoft.com/office/drawing/2014/main" id="{D1E8ADD6-B20F-3A8D-8702-99075F5E55C6}"/>
+              </a:ext>
+            </a:extLst>
+          </p:cNvPr>
+          <p:cNvSpPr>
+            <a:spLocks noGrp="1"/>
+          </p:cNvSpPr>
+          <p:nvPr>
+            <p:ph type="title"/>
+          </p:nvPr>
+        </p:nvSpPr>
+        <p:spPr>
+          <a:xfrm>
+            <a:off x="1097280" y="286603"/>
+            <a:ext cx="10607040" cy="1450757"/>
+          </a:xfrm>
+        </p:spPr>
+        <p:txBody>
+          <a:bodyPr/>
+          <a:lstStyle/>
+          <a:p>
+            <a:r>
+              <a:rPr lang="pt-BR" dirty="0"/>
+              <a:t>Desenvolvimento de aplicações no Arduino</a:t>
+            </a:r>
+          </a:p>
+        </p:txBody>
+      </p:sp>
+      <p:grpSp>
+        <p:nvGrpSpPr>
+          <p:cNvPr id="2" name="Group 9151">
+            <a:extLst>
+              <a:ext uri="{FF2B5EF4-FFF2-40B4-BE49-F238E27FC236}">
+                <a16:creationId xmlns:a16="http://schemas.microsoft.com/office/drawing/2014/main" id="{4753B298-1668-4A30-D6A4-CFD3477FFC9C}"/>
+              </a:ext>
+            </a:extLst>
+          </p:cNvPr>
+          <p:cNvGrpSpPr/>
+          <p:nvPr/>
+        </p:nvGrpSpPr>
+        <p:grpSpPr>
+          <a:xfrm>
+            <a:off x="7132320" y="2624244"/>
+            <a:ext cx="4572000" cy="3648540"/>
+            <a:chOff x="0" y="0"/>
+            <a:chExt cx="3163748" cy="2466467"/>
+          </a:xfrm>
+        </p:grpSpPr>
+        <p:sp>
+          <p:nvSpPr>
+            <p:cNvPr id="5" name="Shape 747">
+              <a:extLst>
+                <a:ext uri="{FF2B5EF4-FFF2-40B4-BE49-F238E27FC236}">
+                  <a16:creationId xmlns:a16="http://schemas.microsoft.com/office/drawing/2014/main" id="{7C6A817A-C9F5-BD09-7AD5-1956F3529E15}"/>
+                </a:ext>
+              </a:extLst>
+            </p:cNvPr>
+            <p:cNvSpPr/>
+            <p:nvPr/>
+          </p:nvSpPr>
+          <p:spPr>
+            <a:xfrm>
+              <a:off x="0" y="0"/>
+              <a:ext cx="3163748" cy="2466467"/>
+            </a:xfrm>
+            <a:custGeom>
+              <a:avLst/>
+              <a:gdLst/>
+              <a:ahLst/>
+              <a:cxnLst/>
+              <a:rect l="0" t="0" r="0" b="0"/>
+              <a:pathLst>
+                <a:path w="3163748" h="2466467">
+                  <a:moveTo>
+                    <a:pt x="108001" y="0"/>
+                  </a:moveTo>
+                  <a:cubicBezTo>
+                    <a:pt x="108001" y="0"/>
+                    <a:pt x="0" y="0"/>
+                    <a:pt x="0" y="108001"/>
+                  </a:cubicBezTo>
+                  <a:lnTo>
+                    <a:pt x="0" y="2358467"/>
+                  </a:lnTo>
+                  <a:cubicBezTo>
+                    <a:pt x="0" y="2358467"/>
+                    <a:pt x="0" y="2466467"/>
+                    <a:pt x="108001" y="2466467"/>
+                  </a:cubicBezTo>
+                  <a:lnTo>
+                    <a:pt x="3055747" y="2466467"/>
+                  </a:lnTo>
+                  <a:cubicBezTo>
+                    <a:pt x="3055747" y="2466467"/>
+                    <a:pt x="3163748" y="2466467"/>
+                    <a:pt x="3163748" y="2358467"/>
+                  </a:cubicBezTo>
+                  <a:lnTo>
+                    <a:pt x="3163748" y="108001"/>
+                  </a:lnTo>
+                  <a:cubicBezTo>
+                    <a:pt x="3163748" y="108001"/>
+                    <a:pt x="3163748" y="0"/>
+                    <a:pt x="3055747" y="0"/>
+                  </a:cubicBezTo>
+                  <a:lnTo>
+                    <a:pt x="108001" y="0"/>
+                  </a:lnTo>
+                  <a:close/>
+                </a:path>
+              </a:pathLst>
+            </a:custGeom>
+            <a:ln w="12700" cap="flat">
+              <a:miter lim="100000"/>
+            </a:ln>
+          </p:spPr>
+          <p:style>
+            <a:lnRef idx="1">
+              <a:srgbClr val="737473"/>
+            </a:lnRef>
+            <a:fillRef idx="0">
+              <a:srgbClr val="000000">
+                <a:alpha val="0"/>
+              </a:srgbClr>
+            </a:fillRef>
+            <a:effectRef idx="0">
+              <a:scrgbClr r="0" g="0" b="0"/>
+            </a:effectRef>
+            <a:fontRef idx="none"/>
+          </p:style>
+          <p:txBody>
+            <a:bodyPr/>
+            <a:lstStyle/>
+            <a:p>
+              <a:endParaRPr lang="pt-BR"/>
+            </a:p>
+          </p:txBody>
+        </p:sp>
+        <p:sp>
+          <p:nvSpPr>
+            <p:cNvPr id="6" name="Rectangle 748">
+              <a:extLst>
+                <a:ext uri="{FF2B5EF4-FFF2-40B4-BE49-F238E27FC236}">
+                  <a16:creationId xmlns:a16="http://schemas.microsoft.com/office/drawing/2014/main" id="{08E56442-9980-28C3-AD99-CE036D01EE0C}"/>
+                </a:ext>
+              </a:extLst>
+            </p:cNvPr>
+            <p:cNvSpPr/>
+            <p:nvPr/>
+          </p:nvSpPr>
+          <p:spPr>
+            <a:xfrm>
+              <a:off x="133350" y="2099789"/>
+              <a:ext cx="528188" cy="165126"/>
+            </a:xfrm>
+            <a:prstGeom prst="rect">
+              <a:avLst/>
+            </a:prstGeom>
+            <a:ln>
+              <a:noFill/>
+            </a:ln>
+          </p:spPr>
+          <p:txBody>
+            <a:bodyPr vert="horz" lIns="0" tIns="0" rIns="0" bIns="0" rtlCol="0">
+              <a:noAutofit/>
+            </a:bodyPr>
+            <a:lstStyle/>
+            <a:p>
+              <a:pPr marL="133350" indent="-6350" algn="l">
+                <a:lnSpc>
+                  <a:spcPct val="107000"/>
+                </a:lnSpc>
+                <a:spcAft>
+                  <a:spcPts val="800"/>
+                </a:spcAft>
+              </a:pPr>
+              <a:r>
+                <a:rPr lang="pt-BR" sz="1200" b="1" kern="100">
+                  <a:solidFill>
+                    <a:srgbClr val="181717"/>
+                  </a:solidFill>
+                  <a:effectLst/>
+                  <a:latin typeface="Calibri" panose="020F0502020204030204" pitchFamily="34" charset="0"/>
+                  <a:ea typeface="Calibri" panose="020F0502020204030204" pitchFamily="34" charset="0"/>
+                </a:rPr>
+                <a:t>Figura</a:t>
+              </a:r>
+              <a:r>
+                <a:rPr lang="pt-BR" sz="1200" b="1" kern="100" spc="-15">
+                  <a:solidFill>
+                    <a:srgbClr val="181717"/>
+                  </a:solidFill>
+                  <a:effectLst/>
+                  <a:latin typeface="Calibri" panose="020F0502020204030204" pitchFamily="34" charset="0"/>
+                  <a:ea typeface="Calibri" panose="020F0502020204030204" pitchFamily="34" charset="0"/>
+                </a:rPr>
+                <a:t> </a:t>
+              </a:r>
+              <a:r>
+                <a:rPr lang="pt-BR" sz="1200" b="1" kern="100">
+                  <a:solidFill>
+                    <a:srgbClr val="181717"/>
+                  </a:solidFill>
+                  <a:effectLst/>
+                  <a:latin typeface="Calibri" panose="020F0502020204030204" pitchFamily="34" charset="0"/>
+                  <a:ea typeface="Calibri" panose="020F0502020204030204" pitchFamily="34" charset="0"/>
+                </a:rPr>
+                <a:t>7.</a:t>
+              </a:r>
+              <a:r>
+                <a:rPr lang="pt-BR" sz="1200" b="1" kern="100" spc="-15">
+                  <a:solidFill>
+                    <a:srgbClr val="181717"/>
+                  </a:solidFill>
+                  <a:effectLst/>
+                  <a:latin typeface="Calibri" panose="020F0502020204030204" pitchFamily="34" charset="0"/>
+                  <a:ea typeface="Calibri" panose="020F0502020204030204" pitchFamily="34" charset="0"/>
+                </a:rPr>
+                <a:t> </a:t>
+              </a:r>
+              <a:endParaRPr lang="pt-BR" sz="1200" kern="100">
+                <a:solidFill>
+                  <a:srgbClr val="181717"/>
+                </a:solidFill>
+                <a:effectLst/>
+                <a:latin typeface="Times New Roman" panose="02020603050405020304" pitchFamily="18" charset="0"/>
+                <a:ea typeface="Times New Roman" panose="02020603050405020304" pitchFamily="18" charset="0"/>
+              </a:endParaRPr>
+            </a:p>
+          </p:txBody>
+        </p:sp>
+        <p:sp>
+          <p:nvSpPr>
+            <p:cNvPr id="7" name="Rectangle 749">
+              <a:extLst>
+                <a:ext uri="{FF2B5EF4-FFF2-40B4-BE49-F238E27FC236}">
+                  <a16:creationId xmlns:a16="http://schemas.microsoft.com/office/drawing/2014/main" id="{20C91AB6-8299-2B27-E7FD-D0EA2D84EA3D}"/>
+                </a:ext>
+              </a:extLst>
+            </p:cNvPr>
+            <p:cNvSpPr/>
+            <p:nvPr/>
+          </p:nvSpPr>
+          <p:spPr>
+            <a:xfrm>
+              <a:off x="530484" y="2103548"/>
+              <a:ext cx="2587999" cy="160126"/>
+            </a:xfrm>
+            <a:prstGeom prst="rect">
+              <a:avLst/>
+            </a:prstGeom>
+            <a:ln>
+              <a:noFill/>
+            </a:ln>
+          </p:spPr>
+          <p:txBody>
+            <a:bodyPr vert="horz" lIns="0" tIns="0" rIns="0" bIns="0" rtlCol="0">
+              <a:noAutofit/>
+            </a:bodyPr>
+            <a:lstStyle/>
+            <a:p>
+              <a:pPr marL="133350" indent="-6350" algn="l">
+                <a:lnSpc>
+                  <a:spcPct val="107000"/>
+                </a:lnSpc>
+                <a:spcAft>
+                  <a:spcPts val="800"/>
+                </a:spcAft>
+              </a:pPr>
+              <a:r>
+                <a:rPr lang="pt-BR" sz="1200" kern="100" dirty="0">
+                  <a:solidFill>
+                    <a:srgbClr val="181717"/>
+                  </a:solidFill>
+                  <a:effectLst/>
+                  <a:latin typeface="Calibri" panose="020F0502020204030204" pitchFamily="34" charset="0"/>
+                  <a:ea typeface="Calibri" panose="020F0502020204030204" pitchFamily="34" charset="0"/>
+                </a:rPr>
+                <a:t>Circuito</a:t>
+              </a:r>
+              <a:r>
+                <a:rPr lang="pt-BR" sz="1200" kern="100" spc="-5" dirty="0">
+                  <a:solidFill>
+                    <a:srgbClr val="181717"/>
+                  </a:solidFill>
+                  <a:effectLst/>
+                  <a:latin typeface="Calibri" panose="020F0502020204030204" pitchFamily="34" charset="0"/>
+                  <a:ea typeface="Calibri" panose="020F0502020204030204" pitchFamily="34" charset="0"/>
+                </a:rPr>
+                <a:t> </a:t>
+              </a:r>
+              <a:r>
+                <a:rPr lang="pt-BR" sz="1200" kern="100" dirty="0">
+                  <a:solidFill>
+                    <a:srgbClr val="181717"/>
+                  </a:solidFill>
+                  <a:effectLst/>
+                  <a:latin typeface="Calibri" panose="020F0502020204030204" pitchFamily="34" charset="0"/>
+                  <a:ea typeface="Calibri" panose="020F0502020204030204" pitchFamily="34" charset="0"/>
+                </a:rPr>
+                <a:t>necessário</a:t>
+              </a:r>
+              <a:r>
+                <a:rPr lang="pt-BR" sz="1200" kern="100" spc="-5" dirty="0">
+                  <a:solidFill>
+                    <a:srgbClr val="181717"/>
+                  </a:solidFill>
+                  <a:effectLst/>
+                  <a:latin typeface="Calibri" panose="020F0502020204030204" pitchFamily="34" charset="0"/>
+                  <a:ea typeface="Calibri" panose="020F0502020204030204" pitchFamily="34" charset="0"/>
+                </a:rPr>
+                <a:t> </a:t>
+              </a:r>
+              <a:r>
+                <a:rPr lang="pt-BR" sz="1200" kern="100" dirty="0">
+                  <a:solidFill>
+                    <a:srgbClr val="181717"/>
+                  </a:solidFill>
+                  <a:effectLst/>
+                  <a:latin typeface="Calibri" panose="020F0502020204030204" pitchFamily="34" charset="0"/>
+                  <a:ea typeface="Calibri" panose="020F0502020204030204" pitchFamily="34" charset="0"/>
+                </a:rPr>
+                <a:t>para</a:t>
+              </a:r>
+              <a:r>
+                <a:rPr lang="pt-BR" sz="1200" kern="100" spc="-5" dirty="0">
+                  <a:solidFill>
+                    <a:srgbClr val="181717"/>
+                  </a:solidFill>
+                  <a:effectLst/>
+                  <a:latin typeface="Calibri" panose="020F0502020204030204" pitchFamily="34" charset="0"/>
+                  <a:ea typeface="Calibri" panose="020F0502020204030204" pitchFamily="34" charset="0"/>
+                </a:rPr>
+                <a:t> </a:t>
+              </a:r>
+              <a:r>
+                <a:rPr lang="pt-BR" sz="1200" kern="100" dirty="0">
+                  <a:solidFill>
+                    <a:srgbClr val="181717"/>
+                  </a:solidFill>
+                  <a:effectLst/>
+                  <a:latin typeface="Calibri" panose="020F0502020204030204" pitchFamily="34" charset="0"/>
+                  <a:ea typeface="Calibri" panose="020F0502020204030204" pitchFamily="34" charset="0"/>
+                </a:rPr>
+                <a:t>o</a:t>
+              </a:r>
+              <a:r>
+                <a:rPr lang="pt-BR" sz="1200" kern="100" spc="-5" dirty="0">
+                  <a:solidFill>
+                    <a:srgbClr val="181717"/>
+                  </a:solidFill>
+                  <a:effectLst/>
+                  <a:latin typeface="Calibri" panose="020F0502020204030204" pitchFamily="34" charset="0"/>
+                  <a:ea typeface="Calibri" panose="020F0502020204030204" pitchFamily="34" charset="0"/>
+                </a:rPr>
+                <a:t> </a:t>
+              </a:r>
+              <a:r>
+                <a:rPr lang="pt-BR" sz="1200" kern="100" dirty="0">
+                  <a:solidFill>
+                    <a:srgbClr val="181717"/>
+                  </a:solidFill>
+                  <a:effectLst/>
+                  <a:latin typeface="Calibri" panose="020F0502020204030204" pitchFamily="34" charset="0"/>
+                  <a:ea typeface="Calibri" panose="020F0502020204030204" pitchFamily="34" charset="0"/>
+                </a:rPr>
+                <a:t>acendimento</a:t>
+              </a:r>
+              <a:r>
+                <a:rPr lang="pt-BR" sz="1200" kern="100" spc="-5" dirty="0">
+                  <a:solidFill>
+                    <a:srgbClr val="181717"/>
+                  </a:solidFill>
+                  <a:effectLst/>
+                  <a:latin typeface="Calibri" panose="020F0502020204030204" pitchFamily="34" charset="0"/>
+                  <a:ea typeface="Calibri" panose="020F0502020204030204" pitchFamily="34" charset="0"/>
+                </a:rPr>
+                <a:t> </a:t>
+              </a:r>
+              <a:r>
+                <a:rPr lang="pt-BR" sz="1200" kern="100" dirty="0">
+                  <a:solidFill>
+                    <a:srgbClr val="181717"/>
+                  </a:solidFill>
+                  <a:effectLst/>
+                  <a:latin typeface="Calibri" panose="020F0502020204030204" pitchFamily="34" charset="0"/>
+                  <a:ea typeface="Calibri" panose="020F0502020204030204" pitchFamily="34" charset="0"/>
+                </a:rPr>
+                <a:t>do</a:t>
+              </a:r>
+              <a:r>
+                <a:rPr lang="pt-BR" sz="1200" kern="100" spc="-5" dirty="0">
+                  <a:solidFill>
+                    <a:srgbClr val="181717"/>
+                  </a:solidFill>
+                  <a:effectLst/>
+                  <a:latin typeface="Calibri" panose="020F0502020204030204" pitchFamily="34" charset="0"/>
+                  <a:ea typeface="Calibri" panose="020F0502020204030204" pitchFamily="34" charset="0"/>
+                </a:rPr>
+                <a:t> </a:t>
+              </a:r>
+              <a:r>
+                <a:rPr lang="pt-BR" sz="1200" kern="100" dirty="0">
+                  <a:solidFill>
+                    <a:srgbClr val="181717"/>
+                  </a:solidFill>
+                  <a:effectLst/>
+                  <a:latin typeface="Calibri" panose="020F0502020204030204" pitchFamily="34" charset="0"/>
+                  <a:ea typeface="Calibri" panose="020F0502020204030204" pitchFamily="34" charset="0"/>
+                </a:rPr>
+                <a:t>LED.</a:t>
+              </a:r>
+              <a:endParaRPr lang="pt-BR" sz="1200" kern="100" dirty="0">
+                <a:solidFill>
+                  <a:srgbClr val="181717"/>
+                </a:solidFill>
+                <a:effectLst/>
+                <a:latin typeface="Times New Roman" panose="02020603050405020304" pitchFamily="18" charset="0"/>
+                <a:ea typeface="Times New Roman" panose="02020603050405020304" pitchFamily="18" charset="0"/>
+              </a:endParaRPr>
+            </a:p>
+          </p:txBody>
+        </p:sp>
+        <p:sp>
+          <p:nvSpPr>
+            <p:cNvPr id="8" name="Rectangle 750">
+              <a:extLst>
+                <a:ext uri="{FF2B5EF4-FFF2-40B4-BE49-F238E27FC236}">
+                  <a16:creationId xmlns:a16="http://schemas.microsoft.com/office/drawing/2014/main" id="{4B51E1C3-8193-6327-FE19-5E2787FEA669}"/>
+                </a:ext>
+              </a:extLst>
+            </p:cNvPr>
+            <p:cNvSpPr/>
+            <p:nvPr/>
+          </p:nvSpPr>
+          <p:spPr>
+            <a:xfrm>
+              <a:off x="133350" y="2266223"/>
+              <a:ext cx="297366" cy="142238"/>
+            </a:xfrm>
+            <a:prstGeom prst="rect">
+              <a:avLst/>
+            </a:prstGeom>
+            <a:ln>
+              <a:noFill/>
+            </a:ln>
+          </p:spPr>
+          <p:txBody>
+            <a:bodyPr vert="horz" lIns="0" tIns="0" rIns="0" bIns="0" rtlCol="0">
+              <a:noAutofit/>
+            </a:bodyPr>
+            <a:lstStyle/>
+            <a:p>
+              <a:pPr marL="133350" indent="-6350" algn="l">
+                <a:lnSpc>
+                  <a:spcPct val="107000"/>
+                </a:lnSpc>
+                <a:spcAft>
+                  <a:spcPts val="800"/>
+                </a:spcAft>
+              </a:pPr>
+              <a:r>
+                <a:rPr lang="pt-BR" sz="1100" i="1" kern="100">
+                  <a:solidFill>
+                    <a:srgbClr val="181717"/>
+                  </a:solidFill>
+                  <a:effectLst/>
+                  <a:latin typeface="Calibri" panose="020F0502020204030204" pitchFamily="34" charset="0"/>
+                  <a:ea typeface="Calibri" panose="020F0502020204030204" pitchFamily="34" charset="0"/>
+                </a:rPr>
+                <a:t>Fonte:</a:t>
+              </a:r>
+              <a:endParaRPr lang="pt-BR" sz="1100" kern="100">
+                <a:solidFill>
+                  <a:srgbClr val="181717"/>
+                </a:solidFill>
+                <a:effectLst/>
+                <a:latin typeface="Times New Roman" panose="02020603050405020304" pitchFamily="18" charset="0"/>
+                <a:ea typeface="Times New Roman" panose="02020603050405020304" pitchFamily="18" charset="0"/>
+              </a:endParaRPr>
+            </a:p>
+          </p:txBody>
+        </p:sp>
+        <p:sp>
+          <p:nvSpPr>
+            <p:cNvPr id="9" name="Rectangle 751">
+              <a:extLst>
+                <a:ext uri="{FF2B5EF4-FFF2-40B4-BE49-F238E27FC236}">
+                  <a16:creationId xmlns:a16="http://schemas.microsoft.com/office/drawing/2014/main" id="{DFDE65C5-F1E3-A420-FD0B-B55B82E5411F}"/>
+                </a:ext>
+              </a:extLst>
+            </p:cNvPr>
+            <p:cNvSpPr/>
+            <p:nvPr/>
+          </p:nvSpPr>
+          <p:spPr>
+            <a:xfrm>
+              <a:off x="356933" y="2267823"/>
+              <a:ext cx="1574621" cy="140111"/>
+            </a:xfrm>
+            <a:prstGeom prst="rect">
+              <a:avLst/>
+            </a:prstGeom>
+            <a:ln>
+              <a:noFill/>
+            </a:ln>
+          </p:spPr>
+          <p:txBody>
+            <a:bodyPr vert="horz" lIns="0" tIns="0" rIns="0" bIns="0" rtlCol="0">
+              <a:noAutofit/>
+            </a:bodyPr>
+            <a:lstStyle/>
+            <a:p>
+              <a:pPr marL="133350" indent="-6350" algn="l">
+                <a:lnSpc>
+                  <a:spcPct val="107000"/>
+                </a:lnSpc>
+                <a:spcAft>
+                  <a:spcPts val="800"/>
+                </a:spcAft>
+              </a:pPr>
+              <a:r>
+                <a:rPr lang="pt-BR" sz="1100" kern="100" spc="-5" dirty="0">
+                  <a:solidFill>
+                    <a:srgbClr val="181717"/>
+                  </a:solidFill>
+                  <a:effectLst/>
+                  <a:latin typeface="Calibri" panose="020F0502020204030204" pitchFamily="34" charset="0"/>
+                  <a:ea typeface="Calibri" panose="020F0502020204030204" pitchFamily="34" charset="0"/>
+                </a:rPr>
+                <a:t> </a:t>
+              </a:r>
+              <a:r>
+                <a:rPr lang="pt-BR" sz="1100" kern="100" dirty="0">
+                  <a:solidFill>
+                    <a:srgbClr val="181717"/>
+                  </a:solidFill>
+                  <a:effectLst/>
+                  <a:latin typeface="Calibri" panose="020F0502020204030204" pitchFamily="34" charset="0"/>
+                  <a:ea typeface="Calibri" panose="020F0502020204030204" pitchFamily="34" charset="0"/>
+                </a:rPr>
+                <a:t>Adaptada</a:t>
+              </a:r>
+              <a:r>
+                <a:rPr lang="pt-BR" sz="1100" kern="100" spc="-5" dirty="0">
+                  <a:solidFill>
+                    <a:srgbClr val="181717"/>
+                  </a:solidFill>
+                  <a:effectLst/>
+                  <a:latin typeface="Calibri" panose="020F0502020204030204" pitchFamily="34" charset="0"/>
+                  <a:ea typeface="Calibri" panose="020F0502020204030204" pitchFamily="34" charset="0"/>
+                </a:rPr>
+                <a:t> </a:t>
+              </a:r>
+              <a:r>
+                <a:rPr lang="pt-BR" sz="1100" kern="100" dirty="0">
+                  <a:solidFill>
+                    <a:srgbClr val="181717"/>
+                  </a:solidFill>
+                  <a:effectLst/>
+                  <a:latin typeface="Calibri" panose="020F0502020204030204" pitchFamily="34" charset="0"/>
+                  <a:ea typeface="Calibri" panose="020F0502020204030204" pitchFamily="34" charset="0"/>
+                </a:rPr>
+                <a:t>de</a:t>
+              </a:r>
+              <a:r>
+                <a:rPr lang="pt-BR" sz="1100" kern="100" spc="-5" dirty="0">
+                  <a:solidFill>
+                    <a:srgbClr val="181717"/>
+                  </a:solidFill>
+                  <a:effectLst/>
+                  <a:latin typeface="Calibri" panose="020F0502020204030204" pitchFamily="34" charset="0"/>
+                  <a:ea typeface="Calibri" panose="020F0502020204030204" pitchFamily="34" charset="0"/>
+                </a:rPr>
+                <a:t> </a:t>
+              </a:r>
+              <a:r>
+                <a:rPr lang="pt-BR" sz="1100" kern="100" dirty="0">
+                  <a:solidFill>
+                    <a:srgbClr val="181717"/>
+                  </a:solidFill>
+                  <a:effectLst/>
+                  <a:latin typeface="Calibri" panose="020F0502020204030204" pitchFamily="34" charset="0"/>
+                  <a:ea typeface="Calibri" panose="020F0502020204030204" pitchFamily="34" charset="0"/>
+                </a:rPr>
+                <a:t>AUTODESK</a:t>
+              </a:r>
+              <a:r>
+                <a:rPr lang="pt-BR" sz="1100" kern="100" spc="-5" dirty="0">
+                  <a:solidFill>
+                    <a:srgbClr val="181717"/>
+                  </a:solidFill>
+                  <a:effectLst/>
+                  <a:latin typeface="Calibri" panose="020F0502020204030204" pitchFamily="34" charset="0"/>
+                  <a:ea typeface="Calibri" panose="020F0502020204030204" pitchFamily="34" charset="0"/>
+                </a:rPr>
+                <a:t> </a:t>
+              </a:r>
+              <a:r>
+                <a:rPr lang="pt-BR" sz="1100" kern="100" dirty="0">
+                  <a:solidFill>
+                    <a:srgbClr val="181717"/>
+                  </a:solidFill>
+                  <a:effectLst/>
+                  <a:latin typeface="Calibri" panose="020F0502020204030204" pitchFamily="34" charset="0"/>
+                  <a:ea typeface="Calibri" panose="020F0502020204030204" pitchFamily="34" charset="0"/>
+                </a:rPr>
+                <a:t>(c2019).</a:t>
+              </a:r>
+              <a:endParaRPr lang="pt-BR" sz="1100" kern="100" dirty="0">
+                <a:solidFill>
+                  <a:srgbClr val="181717"/>
+                </a:solidFill>
+                <a:effectLst/>
+                <a:latin typeface="Times New Roman" panose="02020603050405020304" pitchFamily="18" charset="0"/>
+                <a:ea typeface="Times New Roman" panose="02020603050405020304" pitchFamily="18" charset="0"/>
+              </a:endParaRPr>
+            </a:p>
+          </p:txBody>
+        </p:sp>
+        <p:pic>
+          <p:nvPicPr>
+            <p:cNvPr id="10" name="Picture 753">
+              <a:extLst>
+                <a:ext uri="{FF2B5EF4-FFF2-40B4-BE49-F238E27FC236}">
+                  <a16:creationId xmlns:a16="http://schemas.microsoft.com/office/drawing/2014/main" id="{3CAB194A-4037-4CB0-7EAA-10C9F66100EB}"/>
+                </a:ext>
+              </a:extLst>
+            </p:cNvPr>
+            <p:cNvPicPr/>
+            <p:nvPr/>
+          </p:nvPicPr>
+          <p:blipFill>
+            <a:blip r:embed="rId2"/>
+            <a:stretch>
+              <a:fillRect/>
+            </a:stretch>
+          </p:blipFill>
+          <p:spPr>
+            <a:xfrm>
+              <a:off x="141190" y="147609"/>
+              <a:ext cx="2881110" cy="1852784"/>
+            </a:xfrm>
+            <a:prstGeom prst="rect">
+              <a:avLst/>
+            </a:prstGeom>
+          </p:spPr>
+        </p:pic>
+      </p:grpSp>
+      <p:sp>
+        <p:nvSpPr>
+          <p:cNvPr id="11" name="CaixaDeTexto 10">
+            <a:extLst>
+              <a:ext uri="{FF2B5EF4-FFF2-40B4-BE49-F238E27FC236}">
+                <a16:creationId xmlns:a16="http://schemas.microsoft.com/office/drawing/2014/main" id="{0360FA9A-B93C-CE0F-5FC9-9A223F2ED36F}"/>
+              </a:ext>
+            </a:extLst>
+          </p:cNvPr>
+          <p:cNvSpPr txBox="1"/>
+          <p:nvPr/>
+        </p:nvSpPr>
+        <p:spPr>
+          <a:xfrm>
+            <a:off x="1097280" y="2815080"/>
+            <a:ext cx="6034668" cy="2862322"/>
+          </a:xfrm>
+          <a:prstGeom prst="rect">
+            <a:avLst/>
+          </a:prstGeom>
+          <a:noFill/>
+        </p:spPr>
+        <p:txBody>
+          <a:bodyPr wrap="square" rtlCol="0">
+            <a:spAutoFit/>
+          </a:bodyPr>
+          <a:lstStyle/>
+          <a:p>
+            <a:r>
+              <a:rPr lang="pt-BR" dirty="0">
+                <a:solidFill>
+                  <a:schemeClr val="tx1">
+                    <a:lumMod val="75000"/>
+                    <a:lumOff val="25000"/>
+                  </a:schemeClr>
+                </a:solidFill>
+              </a:rPr>
+              <a:t>Na imagem vemos a conexão de </a:t>
+            </a:r>
+            <a:r>
+              <a:rPr lang="pt-BR" i="1" dirty="0">
+                <a:solidFill>
+                  <a:schemeClr val="tx1">
+                    <a:lumMod val="75000"/>
+                    <a:lumOff val="25000"/>
+                  </a:schemeClr>
+                </a:solidFill>
+              </a:rPr>
+              <a:t>protoboard</a:t>
+            </a:r>
+            <a:r>
+              <a:rPr lang="pt-BR" dirty="0">
+                <a:solidFill>
+                  <a:schemeClr val="tx1">
+                    <a:lumMod val="75000"/>
+                    <a:lumOff val="25000"/>
+                  </a:schemeClr>
+                </a:solidFill>
+              </a:rPr>
+              <a:t> do LED, do resistor com a placa de Arduino energizada com USB.</a:t>
+            </a:r>
+          </a:p>
+          <a:p>
+            <a:r>
+              <a:rPr lang="pt-BR" dirty="0">
+                <a:solidFill>
+                  <a:schemeClr val="tx1">
+                    <a:lumMod val="75000"/>
+                    <a:lumOff val="25000"/>
+                  </a:schemeClr>
+                </a:solidFill>
+              </a:rPr>
+              <a:t>O fio colorido é energizado enquanto o fio preto é o neutro.</a:t>
+            </a:r>
+          </a:p>
+          <a:p>
+            <a:r>
+              <a:rPr lang="pt-BR" dirty="0">
+                <a:solidFill>
+                  <a:schemeClr val="tx1">
+                    <a:lumMod val="75000"/>
+                    <a:lumOff val="25000"/>
+                  </a:schemeClr>
+                </a:solidFill>
+              </a:rPr>
+              <a:t>O fio colorido sai da porta 12, enquanto o neutro sai da porta GND.</a:t>
+            </a:r>
+          </a:p>
+          <a:p>
+            <a:r>
+              <a:rPr lang="pt-BR" dirty="0">
+                <a:solidFill>
+                  <a:schemeClr val="tx1">
+                    <a:lumMod val="75000"/>
+                    <a:lumOff val="25000"/>
+                  </a:schemeClr>
+                </a:solidFill>
+              </a:rPr>
+              <a:t>No LED, a ponta maior está conectado no C15 e o fio colorido está no B15. Abaixo da outra ponta, que está no C14, está o resistor conectado no B14.</a:t>
+            </a:r>
+          </a:p>
+          <a:p>
+            <a:r>
+              <a:rPr lang="pt-BR" dirty="0">
+                <a:solidFill>
+                  <a:schemeClr val="tx1">
+                    <a:lumMod val="75000"/>
+                    <a:lumOff val="25000"/>
+                  </a:schemeClr>
+                </a:solidFill>
+              </a:rPr>
+              <a:t>O terra está ligado na mesma linha que o resistor (que está no –C13) e também ligado ao GND da placa Arduino.</a:t>
+            </a:r>
+          </a:p>
+        </p:txBody>
+      </p:sp>
+    </p:spTree>
+    <p:extLst>
+      <p:ext uri="{BB962C8B-B14F-4D97-AF65-F5344CB8AC3E}">
+        <p14:creationId xmlns:p14="http://schemas.microsoft.com/office/powerpoint/2010/main" val="3879257135"/>
+      </p:ext>
+    </p:extLst>
+  </p:cSld>
+  <p:clrMapOvr>
+    <a:masterClrMapping/>
+  </p:clrMapOvr>
+</p:sld>
+</file>
+
+<file path=ppt/slides/slide22.xml><?xml version="1.0" encoding="utf-8"?>
+<p:sld xmlns:a="http://schemas.openxmlformats.org/drawingml/2006/main" xmlns:r="http://schemas.openxmlformats.org/officeDocument/2006/relationships" xmlns:p="http://schemas.openxmlformats.org/presentationml/2006/main">
+  <p:cSld>
+    <p:spTree>
+      <p:nvGrpSpPr>
+        <p:cNvPr id="1" name=""/>
+        <p:cNvGrpSpPr/>
+        <p:nvPr/>
+      </p:nvGrpSpPr>
+      <p:grpSpPr>
+        <a:xfrm>
+          <a:off x="0" y="0"/>
+          <a:ext cx="0" cy="0"/>
+          <a:chOff x="0" y="0"/>
+          <a:chExt cx="0" cy="0"/>
+        </a:xfrm>
+      </p:grpSpPr>
+      <p:sp>
+        <p:nvSpPr>
+          <p:cNvPr id="3" name="Espaço Reservado para Conteúdo 2">
+            <a:extLst>
+              <a:ext uri="{FF2B5EF4-FFF2-40B4-BE49-F238E27FC236}">
+                <a16:creationId xmlns:a16="http://schemas.microsoft.com/office/drawing/2014/main" id="{E25B33BC-87F9-76F1-4788-B847CF9719AF}"/>
+              </a:ext>
+            </a:extLst>
+          </p:cNvPr>
+          <p:cNvSpPr>
+            <a:spLocks noGrp="1"/>
+          </p:cNvSpPr>
+          <p:nvPr>
+            <p:ph idx="1"/>
+          </p:nvPr>
+        </p:nvSpPr>
+        <p:spPr/>
+        <p:txBody>
+          <a:bodyPr/>
+          <a:lstStyle/>
+          <a:p>
+            <a:r>
+              <a:rPr lang="pt-BR" dirty="0"/>
+              <a:t>Os resistores são componentes eletrônicos que controlam e limitam a passagem de corrente pela placa e pelos demais componentes. Ele pode evitar que algum componente, como o LED, queime.</a:t>
+            </a:r>
+          </a:p>
+          <a:p>
+            <a:endParaRPr lang="pt-BR" dirty="0"/>
+          </a:p>
+        </p:txBody>
+      </p:sp>
+      <p:sp>
+        <p:nvSpPr>
+          <p:cNvPr id="4" name="Título 1">
+            <a:extLst>
+              <a:ext uri="{FF2B5EF4-FFF2-40B4-BE49-F238E27FC236}">
+                <a16:creationId xmlns:a16="http://schemas.microsoft.com/office/drawing/2014/main" id="{D1E8ADD6-B20F-3A8D-8702-99075F5E55C6}"/>
+              </a:ext>
+            </a:extLst>
+          </p:cNvPr>
+          <p:cNvSpPr>
+            <a:spLocks noGrp="1"/>
+          </p:cNvSpPr>
+          <p:nvPr>
+            <p:ph type="title"/>
+          </p:nvPr>
+        </p:nvSpPr>
+        <p:spPr>
+          <a:xfrm>
+            <a:off x="1097280" y="286603"/>
+            <a:ext cx="10607040" cy="1450757"/>
+          </a:xfrm>
+        </p:spPr>
+        <p:txBody>
+          <a:bodyPr>
+            <a:normAutofit/>
+          </a:bodyPr>
+          <a:lstStyle/>
+          <a:p>
+            <a:r>
+              <a:rPr lang="pt-BR" dirty="0"/>
+              <a:t>Desenvolvimento de aplicações no Arduino</a:t>
+            </a:r>
+            <a:br>
+              <a:rPr lang="pt-BR" dirty="0"/>
+            </a:br>
+            <a:r>
+              <a:rPr lang="pt-BR" sz="2200" dirty="0"/>
+              <a:t>DESENVOLVENDO O SOFTWARE PARA O ARDUINO</a:t>
+            </a:r>
+          </a:p>
+        </p:txBody>
+      </p:sp>
+    </p:spTree>
+    <p:extLst>
+      <p:ext uri="{BB962C8B-B14F-4D97-AF65-F5344CB8AC3E}">
+        <p14:creationId xmlns:p14="http://schemas.microsoft.com/office/powerpoint/2010/main" val="1719115763"/>
+      </p:ext>
+    </p:extLst>
+  </p:cSld>
+  <p:clrMapOvr>
+    <a:masterClrMapping/>
+  </p:clrMapOvr>
+</p:sld>
+</file>
+
+<file path=ppt/slides/slide23.xml><?xml version="1.0" encoding="utf-8"?>
+<p:sld xmlns:a="http://schemas.openxmlformats.org/drawingml/2006/main" xmlns:r="http://schemas.openxmlformats.org/officeDocument/2006/relationships" xmlns:p="http://schemas.openxmlformats.org/presentationml/2006/main">
+  <p:cSld>
+    <p:spTree>
+      <p:nvGrpSpPr>
+        <p:cNvPr id="1" name=""/>
+        <p:cNvGrpSpPr/>
+        <p:nvPr/>
+      </p:nvGrpSpPr>
+      <p:grpSpPr>
+        <a:xfrm>
+          <a:off x="0" y="0"/>
+          <a:ext cx="0" cy="0"/>
+          <a:chOff x="0" y="0"/>
+          <a:chExt cx="0" cy="0"/>
+        </a:xfrm>
+      </p:grpSpPr>
+      <p:sp>
+        <p:nvSpPr>
+          <p:cNvPr id="2" name="Título 1">
+            <a:extLst>
+              <a:ext uri="{FF2B5EF4-FFF2-40B4-BE49-F238E27FC236}">
+                <a16:creationId xmlns:a16="http://schemas.microsoft.com/office/drawing/2014/main" id="{B1257B60-B68A-0654-36CB-94C3A3CB1B86}"/>
+              </a:ext>
+            </a:extLst>
+          </p:cNvPr>
+          <p:cNvSpPr>
+            <a:spLocks noGrp="1"/>
+          </p:cNvSpPr>
+          <p:nvPr>
+            <p:ph type="title"/>
+          </p:nvPr>
+        </p:nvSpPr>
+        <p:spPr/>
+        <p:txBody>
+          <a:bodyPr/>
+          <a:lstStyle/>
+          <a:p>
+            <a:r>
+              <a:rPr lang="pt-BR" dirty="0"/>
+              <a:t>Referências</a:t>
+            </a:r>
+          </a:p>
+        </p:txBody>
+      </p:sp>
+      <p:sp>
+        <p:nvSpPr>
+          <p:cNvPr id="3" name="Espaço Reservado para Conteúdo 2">
+            <a:extLst>
+              <a:ext uri="{FF2B5EF4-FFF2-40B4-BE49-F238E27FC236}">
+                <a16:creationId xmlns:a16="http://schemas.microsoft.com/office/drawing/2014/main" id="{FABB78F9-F7D1-1D62-4AC2-0305675CA240}"/>
+              </a:ext>
+            </a:extLst>
+          </p:cNvPr>
+          <p:cNvSpPr>
+            <a:spLocks noGrp="1"/>
+          </p:cNvSpPr>
+          <p:nvPr>
+            <p:ph idx="1"/>
+          </p:nvPr>
+        </p:nvSpPr>
+        <p:spPr/>
+        <p:txBody>
+          <a:bodyPr/>
+          <a:lstStyle/>
+          <a:p>
+            <a:r>
+              <a:rPr lang="pt-BR" b="1" dirty="0"/>
+              <a:t>O que é Arduíno?</a:t>
+            </a:r>
+            <a:endParaRPr lang="pt-BR" dirty="0"/>
+          </a:p>
+          <a:p>
+            <a:r>
+              <a:rPr lang="pt-BR" dirty="0"/>
+              <a:t>https://sites.usp.br/</a:t>
+            </a:r>
+            <a:r>
+              <a:rPr lang="pt-BR" dirty="0" err="1"/>
+              <a:t>ltsi</a:t>
+            </a:r>
+            <a:r>
+              <a:rPr lang="pt-BR" dirty="0"/>
+              <a:t>/</a:t>
+            </a:r>
+            <a:r>
+              <a:rPr lang="pt-BR" dirty="0" err="1"/>
+              <a:t>introducao</a:t>
+            </a:r>
+            <a:r>
+              <a:rPr lang="pt-BR" dirty="0"/>
+              <a:t>/#:~:text=O%20Arduino%20%C3%A9%20uma%20plataforma,a%20eletr%C3%B4nica%20b%C3%A1sica%20e%20programa%C3%A7%C3%A3o.</a:t>
+            </a:r>
+            <a:endParaRPr lang="pt-BR" b="1" dirty="0"/>
+          </a:p>
+          <a:p>
+            <a:r>
+              <a:rPr lang="pt-BR" b="1" dirty="0"/>
+              <a:t>O que é Internet das Coisas?</a:t>
+            </a:r>
+          </a:p>
+          <a:p>
+            <a:r>
+              <a:rPr lang="pt-BR" dirty="0"/>
+              <a:t>https://www.oracle.com/br/internet-of-things/what-is-iot/</a:t>
+            </a:r>
+          </a:p>
+          <a:p>
+            <a:endParaRPr lang="pt-BR" b="1" dirty="0"/>
+          </a:p>
+          <a:p>
+            <a:endParaRPr lang="pt-BR" b="1" dirty="0"/>
+          </a:p>
+          <a:p>
+            <a:endParaRPr lang="pt-BR" b="1" dirty="0"/>
+          </a:p>
+        </p:txBody>
+      </p:sp>
+    </p:spTree>
+    <p:extLst>
+      <p:ext uri="{BB962C8B-B14F-4D97-AF65-F5344CB8AC3E}">
+        <p14:creationId xmlns:p14="http://schemas.microsoft.com/office/powerpoint/2010/main" val="563046003"/>
       </p:ext>
     </p:extLst>
   </p:cSld>

</xml_diff>

<commit_message>
terminando aula 9 de Desenvolvimento Móvel
</commit_message>
<xml_diff>
--- a/Eugenio Mariz de Oliveira Netto/Programação de Aplicativos Mobile II/Aula 9/Introdução à Internet das Coisas na plataforma Arduíno.pptx
+++ b/Eugenio Mariz de Oliveira Netto/Programação de Aplicativos Mobile II/Aula 9/Introdução à Internet das Coisas na plataforma Arduíno.pptx
@@ -27,7 +27,10 @@
     <p:sldId id="276" r:id="rId21"/>
     <p:sldId id="277" r:id="rId22"/>
     <p:sldId id="278" r:id="rId23"/>
-    <p:sldId id="258" r:id="rId24"/>
+    <p:sldId id="279" r:id="rId24"/>
+    <p:sldId id="280" r:id="rId25"/>
+    <p:sldId id="281" r:id="rId26"/>
+    <p:sldId id="258" r:id="rId27"/>
   </p:sldIdLst>
   <p:sldSz cx="12192000" cy="6858000"/>
   <p:notesSz cx="6858000" cy="9144000"/>
@@ -9361,8 +9364,29 @@
           <a:p>
             <a:r>
               <a:rPr lang="pt-BR" dirty="0"/>
-              <a:t>Os resistores são componentes eletrônicos que controlam e limitam a passagem de corrente pela placa e pelos demais componentes. Ele pode evitar que algum componente, como o LED, queime.</a:t>
-            </a:r>
+              <a:t>O Arduino pode se comunicar com o computador via USB, onde é possível enviar e receber mensagens.</a:t>
+            </a:r>
+          </a:p>
+          <a:p>
+            <a:r>
+              <a:rPr lang="pt-BR" dirty="0"/>
+              <a:t>Um Arduino é diferente de um computador, pela baixa memória e por não ter sistema operacional e interface para teclado, mouse e monitor. Mas é possível fazer medições de temperatura, ligar e desligar aquecedores, ou outras atividades especificas.</a:t>
+            </a:r>
+          </a:p>
+          <a:p>
+            <a:r>
+              <a:rPr lang="pt-BR" dirty="0"/>
+              <a:t>Ao programar um Arduino, não há uma complexidade muito grande, sendo até mais fácil do que programar para </a:t>
+            </a:r>
+            <a:r>
+              <a:rPr lang="pt-BR" i="1" dirty="0"/>
+              <a:t>web</a:t>
+            </a:r>
+            <a:r>
+              <a:rPr lang="pt-BR" dirty="0"/>
+              <a:t> (por causa da responsividade, portabilidade e outros fatores).</a:t>
+            </a:r>
+            <a:endParaRPr lang="pt-BR" i="1" dirty="0"/>
           </a:p>
           <a:p>
             <a:endParaRPr lang="pt-BR" dirty="0"/>
@@ -9425,6 +9449,979 @@
 </file>
 
 <file path=ppt/slides/slide23.xml><?xml version="1.0" encoding="utf-8"?>
+<p:sld xmlns:a="http://schemas.openxmlformats.org/drawingml/2006/main" xmlns:r="http://schemas.openxmlformats.org/officeDocument/2006/relationships" xmlns:p="http://schemas.openxmlformats.org/presentationml/2006/main">
+  <p:cSld>
+    <p:spTree>
+      <p:nvGrpSpPr>
+        <p:cNvPr id="1" name=""/>
+        <p:cNvGrpSpPr/>
+        <p:nvPr/>
+      </p:nvGrpSpPr>
+      <p:grpSpPr>
+        <a:xfrm>
+          <a:off x="0" y="0"/>
+          <a:ext cx="0" cy="0"/>
+          <a:chOff x="0" y="0"/>
+          <a:chExt cx="0" cy="0"/>
+        </a:xfrm>
+      </p:grpSpPr>
+      <p:sp>
+        <p:nvSpPr>
+          <p:cNvPr id="3" name="Espaço Reservado para Conteúdo 2">
+            <a:extLst>
+              <a:ext uri="{FF2B5EF4-FFF2-40B4-BE49-F238E27FC236}">
+                <a16:creationId xmlns:a16="http://schemas.microsoft.com/office/drawing/2014/main" id="{E25B33BC-87F9-76F1-4788-B847CF9719AF}"/>
+              </a:ext>
+            </a:extLst>
+          </p:cNvPr>
+          <p:cNvSpPr>
+            <a:spLocks noGrp="1"/>
+          </p:cNvSpPr>
+          <p:nvPr>
+            <p:ph idx="1"/>
+          </p:nvPr>
+        </p:nvSpPr>
+        <p:spPr>
+          <a:xfrm>
+            <a:off x="1097279" y="1845734"/>
+            <a:ext cx="7713299" cy="4023360"/>
+          </a:xfrm>
+        </p:spPr>
+        <p:txBody>
+          <a:bodyPr>
+            <a:normAutofit lnSpcReduction="10000"/>
+          </a:bodyPr>
+          <a:lstStyle/>
+          <a:p>
+            <a:r>
+              <a:rPr lang="pt-BR" dirty="0"/>
+              <a:t>A funcionalidade do código ao lado é fazer um LED acender e apagar com Arduino.</a:t>
+            </a:r>
+          </a:p>
+          <a:p>
+            <a:pPr lvl="1"/>
+            <a:r>
+              <a:rPr lang="pt-BR" b="1" dirty="0"/>
+              <a:t>Linha 1</a:t>
+            </a:r>
+            <a:r>
+              <a:rPr lang="pt-BR" dirty="0"/>
+              <a:t> - temos uma variável que recebe o número da porta digital do Arduino que o LED está conectado.</a:t>
+            </a:r>
+          </a:p>
+          <a:p>
+            <a:pPr lvl="1"/>
+            <a:r>
+              <a:rPr lang="pt-BR" dirty="0"/>
+              <a:t>L</a:t>
+            </a:r>
+            <a:r>
+              <a:rPr lang="pt-BR" b="1" dirty="0"/>
+              <a:t>inha 2</a:t>
+            </a:r>
+            <a:r>
+              <a:rPr lang="pt-BR" dirty="0"/>
+              <a:t> - foi criada uma das funções mais importantes do Arduino, a </a:t>
+            </a:r>
+            <a:r>
+              <a:rPr lang="pt-BR" i="1" dirty="0"/>
+              <a:t>setup()</a:t>
+            </a:r>
+            <a:r>
+              <a:rPr lang="pt-BR" dirty="0"/>
+              <a:t>, onde foi iniciado as configurações iniciais do Arduino.</a:t>
+            </a:r>
+          </a:p>
+          <a:p>
+            <a:pPr lvl="1"/>
+            <a:r>
+              <a:rPr lang="pt-BR" dirty="0"/>
+              <a:t>L</a:t>
+            </a:r>
+            <a:r>
+              <a:rPr lang="pt-BR" b="1" dirty="0"/>
+              <a:t>inha 3 </a:t>
+            </a:r>
+            <a:r>
+              <a:rPr lang="pt-BR" dirty="0"/>
+              <a:t>- foi configurada como </a:t>
+            </a:r>
+            <a:r>
+              <a:rPr lang="pt-BR" u="sng" dirty="0"/>
+              <a:t>saída</a:t>
+            </a:r>
+            <a:r>
+              <a:rPr lang="pt-BR" dirty="0"/>
+              <a:t> de energia. Pela função </a:t>
+            </a:r>
+            <a:r>
+              <a:rPr lang="pt-BR" i="1" dirty="0" err="1"/>
+              <a:t>pinMode</a:t>
+            </a:r>
+            <a:r>
+              <a:rPr lang="pt-BR" i="1" dirty="0"/>
+              <a:t>()</a:t>
+            </a:r>
+            <a:r>
+              <a:rPr lang="pt-BR" dirty="0"/>
+              <a:t> podemos ter dois parâmetros, onde um indica a o número da porta e o outro indica o tipo da porta </a:t>
+            </a:r>
+            <a:r>
+              <a:rPr lang="pt-BR" i="1" dirty="0"/>
+              <a:t>(INPUT</a:t>
+            </a:r>
+            <a:r>
+              <a:rPr lang="pt-BR" dirty="0"/>
+              <a:t> ou </a:t>
+            </a:r>
+            <a:r>
+              <a:rPr lang="pt-BR" i="1" dirty="0"/>
+              <a:t>OUTPUT)</a:t>
+            </a:r>
+            <a:r>
+              <a:rPr lang="pt-BR" dirty="0"/>
+              <a:t>, que no nosso caso receberá </a:t>
+            </a:r>
+            <a:r>
+              <a:rPr lang="pt-BR" i="1" dirty="0"/>
+              <a:t>OUTPUT</a:t>
+            </a:r>
+            <a:r>
+              <a:rPr lang="pt-BR" dirty="0"/>
+              <a:t>.</a:t>
+            </a:r>
+          </a:p>
+          <a:p>
+            <a:pPr lvl="1"/>
+            <a:r>
+              <a:rPr lang="pt-BR" b="1" dirty="0"/>
+              <a:t>Linha 5</a:t>
+            </a:r>
+            <a:r>
+              <a:rPr lang="pt-BR" dirty="0"/>
+              <a:t> - a função </a:t>
+            </a:r>
+            <a:r>
+              <a:rPr lang="pt-BR" i="1" dirty="0"/>
+              <a:t>loop()</a:t>
+            </a:r>
+            <a:r>
+              <a:rPr lang="pt-BR" dirty="0"/>
+              <a:t> foi iniciada. </a:t>
+            </a:r>
+          </a:p>
+          <a:p>
+            <a:pPr lvl="1"/>
+            <a:r>
+              <a:rPr lang="pt-BR" b="1" dirty="0"/>
+              <a:t>Linha 6</a:t>
+            </a:r>
+            <a:r>
+              <a:rPr lang="pt-BR" dirty="0"/>
+              <a:t> - foi utilizado a função </a:t>
+            </a:r>
+            <a:r>
+              <a:rPr lang="pt-BR" i="1" dirty="0" err="1"/>
+              <a:t>digitalWrite</a:t>
+            </a:r>
+            <a:r>
+              <a:rPr lang="pt-BR" i="1" dirty="0"/>
+              <a:t>()</a:t>
+            </a:r>
+            <a:r>
+              <a:rPr lang="pt-BR" dirty="0"/>
+              <a:t>, que faz o Arduino ligar a porta 13. Esta função é feita para escrever valores para ligar e desligar (</a:t>
+            </a:r>
+            <a:r>
+              <a:rPr lang="pt-BR" i="1" dirty="0"/>
+              <a:t>HIGH</a:t>
+            </a:r>
+            <a:r>
+              <a:rPr lang="pt-BR" dirty="0"/>
+              <a:t> e </a:t>
+            </a:r>
+            <a:r>
+              <a:rPr lang="pt-BR" i="1" dirty="0"/>
+              <a:t>LOW</a:t>
+            </a:r>
+            <a:r>
+              <a:rPr lang="pt-BR" dirty="0"/>
+              <a:t>) portas digitais, e recebe dois parâmetros; para indicar o número da porta e outro para indicar se deve estar ligado ou desligado.</a:t>
+            </a:r>
+            <a:endParaRPr lang="pt-BR" b="1" dirty="0"/>
+          </a:p>
+          <a:p>
+            <a:endParaRPr lang="pt-BR" dirty="0"/>
+          </a:p>
+        </p:txBody>
+      </p:sp>
+      <p:sp>
+        <p:nvSpPr>
+          <p:cNvPr id="4" name="Título 1">
+            <a:extLst>
+              <a:ext uri="{FF2B5EF4-FFF2-40B4-BE49-F238E27FC236}">
+                <a16:creationId xmlns:a16="http://schemas.microsoft.com/office/drawing/2014/main" id="{D1E8ADD6-B20F-3A8D-8702-99075F5E55C6}"/>
+              </a:ext>
+            </a:extLst>
+          </p:cNvPr>
+          <p:cNvSpPr>
+            <a:spLocks noGrp="1"/>
+          </p:cNvSpPr>
+          <p:nvPr>
+            <p:ph type="title"/>
+          </p:nvPr>
+        </p:nvSpPr>
+        <p:spPr>
+          <a:xfrm>
+            <a:off x="1097280" y="286603"/>
+            <a:ext cx="10607040" cy="1450757"/>
+          </a:xfrm>
+        </p:spPr>
+        <p:txBody>
+          <a:bodyPr>
+            <a:normAutofit/>
+          </a:bodyPr>
+          <a:lstStyle/>
+          <a:p>
+            <a:r>
+              <a:rPr lang="pt-BR" dirty="0"/>
+              <a:t>Desenvolvimento de aplicações no Arduino</a:t>
+            </a:r>
+            <a:br>
+              <a:rPr lang="pt-BR" dirty="0"/>
+            </a:br>
+            <a:r>
+              <a:rPr lang="pt-BR" sz="2200" dirty="0"/>
+              <a:t>DESENVOLVENDO O SOFTWARE PARA O ARDUINO</a:t>
+            </a:r>
+          </a:p>
+        </p:txBody>
+      </p:sp>
+      <p:sp>
+        <p:nvSpPr>
+          <p:cNvPr id="2" name="CaixaDeTexto 1">
+            <a:extLst>
+              <a:ext uri="{FF2B5EF4-FFF2-40B4-BE49-F238E27FC236}">
+                <a16:creationId xmlns:a16="http://schemas.microsoft.com/office/drawing/2014/main" id="{51AE4030-DA3A-CA20-6EB6-18B4350EF805}"/>
+              </a:ext>
+            </a:extLst>
+          </p:cNvPr>
+          <p:cNvSpPr txBox="1"/>
+          <p:nvPr/>
+        </p:nvSpPr>
+        <p:spPr>
+          <a:xfrm>
+            <a:off x="8810579" y="1997839"/>
+            <a:ext cx="2893741" cy="2862322"/>
+          </a:xfrm>
+          <a:prstGeom prst="rect">
+            <a:avLst/>
+          </a:prstGeom>
+          <a:solidFill>
+            <a:schemeClr val="bg1"/>
+          </a:solidFill>
+          <a:ln>
+            <a:solidFill>
+              <a:schemeClr val="accent1"/>
+            </a:solidFill>
+          </a:ln>
+        </p:spPr>
+        <p:txBody>
+          <a:bodyPr wrap="none" rtlCol="0">
+            <a:spAutoFit/>
+          </a:bodyPr>
+          <a:lstStyle/>
+          <a:p>
+            <a:r>
+              <a:rPr lang="pt-BR" dirty="0">
+                <a:solidFill>
+                  <a:srgbClr val="FF0000"/>
+                </a:solidFill>
+              </a:rPr>
+              <a:t>1</a:t>
+            </a:r>
+            <a:r>
+              <a:rPr lang="pt-BR" dirty="0"/>
+              <a:t>   </a:t>
+            </a:r>
+            <a:r>
+              <a:rPr lang="pt-BR" dirty="0" err="1"/>
+              <a:t>int</a:t>
+            </a:r>
+            <a:r>
+              <a:rPr lang="pt-BR" dirty="0"/>
+              <a:t> led = 13;</a:t>
+            </a:r>
+          </a:p>
+          <a:p>
+            <a:r>
+              <a:rPr lang="pt-BR" dirty="0">
+                <a:solidFill>
+                  <a:srgbClr val="FF0000"/>
+                </a:solidFill>
+              </a:rPr>
+              <a:t>2</a:t>
+            </a:r>
+            <a:r>
+              <a:rPr lang="pt-BR" dirty="0"/>
+              <a:t>   </a:t>
+            </a:r>
+            <a:r>
+              <a:rPr lang="pt-BR" dirty="0" err="1"/>
+              <a:t>void</a:t>
+            </a:r>
+            <a:r>
+              <a:rPr lang="pt-BR" dirty="0"/>
+              <a:t> setup(){</a:t>
+            </a:r>
+          </a:p>
+          <a:p>
+            <a:r>
+              <a:rPr lang="pt-BR" dirty="0">
+                <a:solidFill>
+                  <a:srgbClr val="FF0000"/>
+                </a:solidFill>
+              </a:rPr>
+              <a:t>3</a:t>
+            </a:r>
+            <a:r>
+              <a:rPr lang="pt-BR" dirty="0"/>
+              <a:t> 	</a:t>
+            </a:r>
+            <a:r>
+              <a:rPr lang="pt-BR" dirty="0" err="1"/>
+              <a:t>pinMode</a:t>
+            </a:r>
+            <a:r>
+              <a:rPr lang="pt-BR" dirty="0"/>
+              <a:t>(led, OUTPUT);</a:t>
+            </a:r>
+          </a:p>
+          <a:p>
+            <a:r>
+              <a:rPr lang="pt-BR" dirty="0">
+                <a:solidFill>
+                  <a:srgbClr val="FF0000"/>
+                </a:solidFill>
+              </a:rPr>
+              <a:t>4</a:t>
+            </a:r>
+            <a:r>
+              <a:rPr lang="pt-BR" dirty="0"/>
+              <a:t>   }</a:t>
+            </a:r>
+          </a:p>
+          <a:p>
+            <a:r>
+              <a:rPr lang="pt-BR" dirty="0">
+                <a:solidFill>
+                  <a:srgbClr val="FF0000"/>
+                </a:solidFill>
+              </a:rPr>
+              <a:t>5</a:t>
+            </a:r>
+            <a:r>
+              <a:rPr lang="pt-BR" dirty="0"/>
+              <a:t>   </a:t>
+            </a:r>
+            <a:r>
+              <a:rPr lang="pt-BR" dirty="0" err="1"/>
+              <a:t>void</a:t>
+            </a:r>
+            <a:r>
+              <a:rPr lang="pt-BR" dirty="0"/>
+              <a:t> loop(){</a:t>
+            </a:r>
+          </a:p>
+          <a:p>
+            <a:r>
+              <a:rPr lang="pt-BR" dirty="0">
+                <a:solidFill>
+                  <a:srgbClr val="FF0000"/>
+                </a:solidFill>
+              </a:rPr>
+              <a:t>6</a:t>
+            </a:r>
+            <a:r>
+              <a:rPr lang="pt-BR" dirty="0"/>
+              <a:t> 	</a:t>
+            </a:r>
+            <a:r>
+              <a:rPr lang="pt-BR" dirty="0" err="1"/>
+              <a:t>digitalWrite</a:t>
+            </a:r>
+            <a:r>
+              <a:rPr lang="pt-BR" dirty="0"/>
+              <a:t>(led, HIGH);</a:t>
+            </a:r>
+          </a:p>
+          <a:p>
+            <a:r>
+              <a:rPr lang="pt-BR" dirty="0">
+                <a:solidFill>
+                  <a:srgbClr val="FF0000"/>
+                </a:solidFill>
+              </a:rPr>
+              <a:t>7</a:t>
+            </a:r>
+            <a:r>
+              <a:rPr lang="pt-BR" dirty="0"/>
+              <a:t>	delay(1000);</a:t>
+            </a:r>
+          </a:p>
+          <a:p>
+            <a:r>
+              <a:rPr lang="pt-BR" dirty="0">
+                <a:solidFill>
+                  <a:srgbClr val="FF0000"/>
+                </a:solidFill>
+              </a:rPr>
+              <a:t>8</a:t>
+            </a:r>
+            <a:r>
+              <a:rPr lang="pt-BR" dirty="0"/>
+              <a:t>	</a:t>
+            </a:r>
+            <a:r>
+              <a:rPr lang="pt-BR" dirty="0" err="1"/>
+              <a:t>digitalWrite</a:t>
+            </a:r>
+            <a:r>
+              <a:rPr lang="pt-BR" dirty="0"/>
+              <a:t>(led, LOW);</a:t>
+            </a:r>
+          </a:p>
+          <a:p>
+            <a:r>
+              <a:rPr lang="pt-BR" dirty="0">
+                <a:solidFill>
+                  <a:srgbClr val="FF0000"/>
+                </a:solidFill>
+              </a:rPr>
+              <a:t>9</a:t>
+            </a:r>
+            <a:r>
+              <a:rPr lang="pt-BR" dirty="0"/>
+              <a:t>	delay(1000);</a:t>
+            </a:r>
+          </a:p>
+          <a:p>
+            <a:r>
+              <a:rPr lang="pt-BR" dirty="0">
+                <a:solidFill>
+                  <a:srgbClr val="FF0000"/>
+                </a:solidFill>
+              </a:rPr>
+              <a:t>10</a:t>
+            </a:r>
+            <a:r>
+              <a:rPr lang="pt-BR" dirty="0"/>
+              <a:t> }</a:t>
+            </a:r>
+          </a:p>
+        </p:txBody>
+      </p:sp>
+    </p:spTree>
+    <p:extLst>
+      <p:ext uri="{BB962C8B-B14F-4D97-AF65-F5344CB8AC3E}">
+        <p14:creationId xmlns:p14="http://schemas.microsoft.com/office/powerpoint/2010/main" val="1448332031"/>
+      </p:ext>
+    </p:extLst>
+  </p:cSld>
+  <p:clrMapOvr>
+    <a:masterClrMapping/>
+  </p:clrMapOvr>
+</p:sld>
+</file>
+
+<file path=ppt/slides/slide24.xml><?xml version="1.0" encoding="utf-8"?>
+<p:sld xmlns:a="http://schemas.openxmlformats.org/drawingml/2006/main" xmlns:r="http://schemas.openxmlformats.org/officeDocument/2006/relationships" xmlns:p="http://schemas.openxmlformats.org/presentationml/2006/main">
+  <p:cSld>
+    <p:spTree>
+      <p:nvGrpSpPr>
+        <p:cNvPr id="1" name=""/>
+        <p:cNvGrpSpPr/>
+        <p:nvPr/>
+      </p:nvGrpSpPr>
+      <p:grpSpPr>
+        <a:xfrm>
+          <a:off x="0" y="0"/>
+          <a:ext cx="0" cy="0"/>
+          <a:chOff x="0" y="0"/>
+          <a:chExt cx="0" cy="0"/>
+        </a:xfrm>
+      </p:grpSpPr>
+      <p:sp>
+        <p:nvSpPr>
+          <p:cNvPr id="3" name="Espaço Reservado para Conteúdo 2">
+            <a:extLst>
+              <a:ext uri="{FF2B5EF4-FFF2-40B4-BE49-F238E27FC236}">
+                <a16:creationId xmlns:a16="http://schemas.microsoft.com/office/drawing/2014/main" id="{E25B33BC-87F9-76F1-4788-B847CF9719AF}"/>
+              </a:ext>
+            </a:extLst>
+          </p:cNvPr>
+          <p:cNvSpPr>
+            <a:spLocks noGrp="1"/>
+          </p:cNvSpPr>
+          <p:nvPr>
+            <p:ph idx="1"/>
+          </p:nvPr>
+        </p:nvSpPr>
+        <p:spPr>
+          <a:xfrm>
+            <a:off x="1097279" y="1845734"/>
+            <a:ext cx="7713299" cy="4023360"/>
+          </a:xfrm>
+        </p:spPr>
+        <p:txBody>
+          <a:bodyPr/>
+          <a:lstStyle/>
+          <a:p>
+            <a:pPr lvl="1"/>
+            <a:r>
+              <a:rPr lang="pt-BR" b="1" dirty="0"/>
+              <a:t>Linha 7</a:t>
+            </a:r>
+            <a:r>
+              <a:rPr lang="pt-BR" dirty="0"/>
+              <a:t> – a função </a:t>
+            </a:r>
+            <a:r>
+              <a:rPr lang="pt-BR" i="1" dirty="0"/>
+              <a:t>delay()</a:t>
+            </a:r>
+            <a:r>
+              <a:rPr lang="pt-BR" dirty="0"/>
+              <a:t> indica o Arduino iniciar a função da linha 6, onde o parâmetro indica que a função terá um tempo de resposta de 1000 milissegundos (1s).</a:t>
+            </a:r>
+          </a:p>
+          <a:p>
+            <a:pPr lvl="1"/>
+            <a:r>
+              <a:rPr lang="pt-BR" b="1" dirty="0"/>
+              <a:t>Linha 8 </a:t>
+            </a:r>
+            <a:r>
+              <a:rPr lang="pt-BR" dirty="0"/>
+              <a:t>e </a:t>
+            </a:r>
+            <a:r>
+              <a:rPr lang="pt-BR" b="1" dirty="0"/>
+              <a:t>9</a:t>
+            </a:r>
+            <a:r>
+              <a:rPr lang="pt-BR" dirty="0"/>
+              <a:t> – a mesma lógica aplicada a linha 6 e 7 também é aplicada aqui, com a diferença que a luz será apagada.</a:t>
+            </a:r>
+            <a:endParaRPr lang="pt-BR" b="1" dirty="0"/>
+          </a:p>
+          <a:p>
+            <a:endParaRPr lang="pt-BR" dirty="0"/>
+          </a:p>
+        </p:txBody>
+      </p:sp>
+      <p:sp>
+        <p:nvSpPr>
+          <p:cNvPr id="4" name="Título 1">
+            <a:extLst>
+              <a:ext uri="{FF2B5EF4-FFF2-40B4-BE49-F238E27FC236}">
+                <a16:creationId xmlns:a16="http://schemas.microsoft.com/office/drawing/2014/main" id="{D1E8ADD6-B20F-3A8D-8702-99075F5E55C6}"/>
+              </a:ext>
+            </a:extLst>
+          </p:cNvPr>
+          <p:cNvSpPr>
+            <a:spLocks noGrp="1"/>
+          </p:cNvSpPr>
+          <p:nvPr>
+            <p:ph type="title"/>
+          </p:nvPr>
+        </p:nvSpPr>
+        <p:spPr>
+          <a:xfrm>
+            <a:off x="1097280" y="286603"/>
+            <a:ext cx="10607040" cy="1450757"/>
+          </a:xfrm>
+        </p:spPr>
+        <p:txBody>
+          <a:bodyPr>
+            <a:normAutofit/>
+          </a:bodyPr>
+          <a:lstStyle/>
+          <a:p>
+            <a:r>
+              <a:rPr lang="pt-BR" dirty="0"/>
+              <a:t>Desenvolvimento de aplicações no Arduino</a:t>
+            </a:r>
+            <a:br>
+              <a:rPr lang="pt-BR" dirty="0"/>
+            </a:br>
+            <a:r>
+              <a:rPr lang="pt-BR" sz="2200" dirty="0"/>
+              <a:t>DESENVOLVENDO O SOFTWARE PARA O ARDUINO</a:t>
+            </a:r>
+          </a:p>
+        </p:txBody>
+      </p:sp>
+      <p:sp>
+        <p:nvSpPr>
+          <p:cNvPr id="2" name="CaixaDeTexto 1">
+            <a:extLst>
+              <a:ext uri="{FF2B5EF4-FFF2-40B4-BE49-F238E27FC236}">
+                <a16:creationId xmlns:a16="http://schemas.microsoft.com/office/drawing/2014/main" id="{51AE4030-DA3A-CA20-6EB6-18B4350EF805}"/>
+              </a:ext>
+            </a:extLst>
+          </p:cNvPr>
+          <p:cNvSpPr txBox="1"/>
+          <p:nvPr/>
+        </p:nvSpPr>
+        <p:spPr>
+          <a:xfrm>
+            <a:off x="8810579" y="1997839"/>
+            <a:ext cx="2893741" cy="2862322"/>
+          </a:xfrm>
+          <a:prstGeom prst="rect">
+            <a:avLst/>
+          </a:prstGeom>
+          <a:solidFill>
+            <a:schemeClr val="bg1"/>
+          </a:solidFill>
+          <a:ln>
+            <a:solidFill>
+              <a:schemeClr val="accent1"/>
+            </a:solidFill>
+          </a:ln>
+        </p:spPr>
+        <p:txBody>
+          <a:bodyPr wrap="none" rtlCol="0">
+            <a:spAutoFit/>
+          </a:bodyPr>
+          <a:lstStyle/>
+          <a:p>
+            <a:r>
+              <a:rPr lang="pt-BR" dirty="0">
+                <a:solidFill>
+                  <a:srgbClr val="FF0000"/>
+                </a:solidFill>
+              </a:rPr>
+              <a:t>1</a:t>
+            </a:r>
+            <a:r>
+              <a:rPr lang="pt-BR" dirty="0"/>
+              <a:t>   </a:t>
+            </a:r>
+            <a:r>
+              <a:rPr lang="pt-BR" dirty="0" err="1"/>
+              <a:t>int</a:t>
+            </a:r>
+            <a:r>
+              <a:rPr lang="pt-BR" dirty="0"/>
+              <a:t> led = 13;</a:t>
+            </a:r>
+          </a:p>
+          <a:p>
+            <a:r>
+              <a:rPr lang="pt-BR" dirty="0">
+                <a:solidFill>
+                  <a:srgbClr val="FF0000"/>
+                </a:solidFill>
+              </a:rPr>
+              <a:t>2</a:t>
+            </a:r>
+            <a:r>
+              <a:rPr lang="pt-BR" dirty="0"/>
+              <a:t>   </a:t>
+            </a:r>
+            <a:r>
+              <a:rPr lang="pt-BR" dirty="0" err="1"/>
+              <a:t>void</a:t>
+            </a:r>
+            <a:r>
+              <a:rPr lang="pt-BR" dirty="0"/>
+              <a:t> setup(){</a:t>
+            </a:r>
+          </a:p>
+          <a:p>
+            <a:r>
+              <a:rPr lang="pt-BR" dirty="0">
+                <a:solidFill>
+                  <a:srgbClr val="FF0000"/>
+                </a:solidFill>
+              </a:rPr>
+              <a:t>3</a:t>
+            </a:r>
+            <a:r>
+              <a:rPr lang="pt-BR" dirty="0"/>
+              <a:t> 	</a:t>
+            </a:r>
+            <a:r>
+              <a:rPr lang="pt-BR" dirty="0" err="1"/>
+              <a:t>pinMode</a:t>
+            </a:r>
+            <a:r>
+              <a:rPr lang="pt-BR" dirty="0"/>
+              <a:t>(led, OUTPUT);</a:t>
+            </a:r>
+          </a:p>
+          <a:p>
+            <a:r>
+              <a:rPr lang="pt-BR" dirty="0">
+                <a:solidFill>
+                  <a:srgbClr val="FF0000"/>
+                </a:solidFill>
+              </a:rPr>
+              <a:t>4</a:t>
+            </a:r>
+            <a:r>
+              <a:rPr lang="pt-BR" dirty="0"/>
+              <a:t>   }</a:t>
+            </a:r>
+          </a:p>
+          <a:p>
+            <a:r>
+              <a:rPr lang="pt-BR" dirty="0">
+                <a:solidFill>
+                  <a:srgbClr val="FF0000"/>
+                </a:solidFill>
+              </a:rPr>
+              <a:t>5</a:t>
+            </a:r>
+            <a:r>
+              <a:rPr lang="pt-BR" dirty="0"/>
+              <a:t>   </a:t>
+            </a:r>
+            <a:r>
+              <a:rPr lang="pt-BR" dirty="0" err="1"/>
+              <a:t>void</a:t>
+            </a:r>
+            <a:r>
+              <a:rPr lang="pt-BR" dirty="0"/>
+              <a:t> loop(){</a:t>
+            </a:r>
+          </a:p>
+          <a:p>
+            <a:r>
+              <a:rPr lang="pt-BR" dirty="0">
+                <a:solidFill>
+                  <a:srgbClr val="FF0000"/>
+                </a:solidFill>
+              </a:rPr>
+              <a:t>6</a:t>
+            </a:r>
+            <a:r>
+              <a:rPr lang="pt-BR" dirty="0"/>
+              <a:t> 	</a:t>
+            </a:r>
+            <a:r>
+              <a:rPr lang="pt-BR" dirty="0" err="1"/>
+              <a:t>digitalWrite</a:t>
+            </a:r>
+            <a:r>
+              <a:rPr lang="pt-BR" dirty="0"/>
+              <a:t>(led, HIGH);</a:t>
+            </a:r>
+          </a:p>
+          <a:p>
+            <a:r>
+              <a:rPr lang="pt-BR" dirty="0">
+                <a:solidFill>
+                  <a:srgbClr val="FF0000"/>
+                </a:solidFill>
+              </a:rPr>
+              <a:t>7</a:t>
+            </a:r>
+            <a:r>
+              <a:rPr lang="pt-BR" dirty="0"/>
+              <a:t>	delay(1000);</a:t>
+            </a:r>
+          </a:p>
+          <a:p>
+            <a:r>
+              <a:rPr lang="pt-BR" dirty="0">
+                <a:solidFill>
+                  <a:srgbClr val="FF0000"/>
+                </a:solidFill>
+              </a:rPr>
+              <a:t>8</a:t>
+            </a:r>
+            <a:r>
+              <a:rPr lang="pt-BR" dirty="0"/>
+              <a:t>	</a:t>
+            </a:r>
+            <a:r>
+              <a:rPr lang="pt-BR" dirty="0" err="1"/>
+              <a:t>digitalWrite</a:t>
+            </a:r>
+            <a:r>
+              <a:rPr lang="pt-BR" dirty="0"/>
+              <a:t>(led, LOW);</a:t>
+            </a:r>
+          </a:p>
+          <a:p>
+            <a:r>
+              <a:rPr lang="pt-BR" dirty="0">
+                <a:solidFill>
+                  <a:srgbClr val="FF0000"/>
+                </a:solidFill>
+              </a:rPr>
+              <a:t>9</a:t>
+            </a:r>
+            <a:r>
+              <a:rPr lang="pt-BR" dirty="0"/>
+              <a:t>	delay(1000);</a:t>
+            </a:r>
+          </a:p>
+          <a:p>
+            <a:r>
+              <a:rPr lang="pt-BR" dirty="0">
+                <a:solidFill>
+                  <a:srgbClr val="FF0000"/>
+                </a:solidFill>
+              </a:rPr>
+              <a:t>10</a:t>
+            </a:r>
+            <a:r>
+              <a:rPr lang="pt-BR" dirty="0"/>
+              <a:t> }</a:t>
+            </a:r>
+          </a:p>
+        </p:txBody>
+      </p:sp>
+    </p:spTree>
+    <p:extLst>
+      <p:ext uri="{BB962C8B-B14F-4D97-AF65-F5344CB8AC3E}">
+        <p14:creationId xmlns:p14="http://schemas.microsoft.com/office/powerpoint/2010/main" val="1746116093"/>
+      </p:ext>
+    </p:extLst>
+  </p:cSld>
+  <p:clrMapOvr>
+    <a:masterClrMapping/>
+  </p:clrMapOvr>
+</p:sld>
+</file>
+
+<file path=ppt/slides/slide25.xml><?xml version="1.0" encoding="utf-8"?>
+<p:sld xmlns:a="http://schemas.openxmlformats.org/drawingml/2006/main" xmlns:r="http://schemas.openxmlformats.org/officeDocument/2006/relationships" xmlns:p="http://schemas.openxmlformats.org/presentationml/2006/main">
+  <p:cSld>
+    <p:spTree>
+      <p:nvGrpSpPr>
+        <p:cNvPr id="1" name=""/>
+        <p:cNvGrpSpPr/>
+        <p:nvPr/>
+      </p:nvGrpSpPr>
+      <p:grpSpPr>
+        <a:xfrm>
+          <a:off x="0" y="0"/>
+          <a:ext cx="0" cy="0"/>
+          <a:chOff x="0" y="0"/>
+          <a:chExt cx="0" cy="0"/>
+        </a:xfrm>
+      </p:grpSpPr>
+      <p:sp>
+        <p:nvSpPr>
+          <p:cNvPr id="3" name="Espaço Reservado para Conteúdo 2">
+            <a:extLst>
+              <a:ext uri="{FF2B5EF4-FFF2-40B4-BE49-F238E27FC236}">
+                <a16:creationId xmlns:a16="http://schemas.microsoft.com/office/drawing/2014/main" id="{E25B33BC-87F9-76F1-4788-B847CF9719AF}"/>
+              </a:ext>
+            </a:extLst>
+          </p:cNvPr>
+          <p:cNvSpPr>
+            <a:spLocks noGrp="1"/>
+          </p:cNvSpPr>
+          <p:nvPr>
+            <p:ph idx="1"/>
+          </p:nvPr>
+        </p:nvSpPr>
+        <p:spPr>
+          <a:xfrm>
+            <a:off x="1097279" y="1845734"/>
+            <a:ext cx="10113265" cy="4023360"/>
+          </a:xfrm>
+        </p:spPr>
+        <p:txBody>
+          <a:bodyPr/>
+          <a:lstStyle/>
+          <a:p>
+            <a:r>
+              <a:rPr lang="pt-BR" dirty="0"/>
+              <a:t>Para enviar o código ao Arduino, será necessário utilizar o software que foi instalado no sistema operacional (o mesmo utilizado para programar). </a:t>
+            </a:r>
+          </a:p>
+          <a:p>
+            <a:r>
+              <a:rPr lang="pt-BR" dirty="0"/>
+              <a:t>O software deverá conter um botão de </a:t>
+            </a:r>
+            <a:r>
+              <a:rPr lang="pt-BR" i="1" dirty="0"/>
+              <a:t>upload</a:t>
+            </a:r>
+            <a:r>
+              <a:rPr lang="pt-BR" dirty="0"/>
+              <a:t> de arquivo, e o Arduino precisa estar conectado ao USB para o software funcionar.</a:t>
+            </a:r>
+          </a:p>
+          <a:p>
+            <a:endParaRPr lang="pt-BR" dirty="0"/>
+          </a:p>
+        </p:txBody>
+      </p:sp>
+      <p:sp>
+        <p:nvSpPr>
+          <p:cNvPr id="4" name="Título 1">
+            <a:extLst>
+              <a:ext uri="{FF2B5EF4-FFF2-40B4-BE49-F238E27FC236}">
+                <a16:creationId xmlns:a16="http://schemas.microsoft.com/office/drawing/2014/main" id="{D1E8ADD6-B20F-3A8D-8702-99075F5E55C6}"/>
+              </a:ext>
+            </a:extLst>
+          </p:cNvPr>
+          <p:cNvSpPr>
+            <a:spLocks noGrp="1"/>
+          </p:cNvSpPr>
+          <p:nvPr>
+            <p:ph type="title"/>
+          </p:nvPr>
+        </p:nvSpPr>
+        <p:spPr>
+          <a:xfrm>
+            <a:off x="1097280" y="286603"/>
+            <a:ext cx="10607040" cy="1450757"/>
+          </a:xfrm>
+        </p:spPr>
+        <p:txBody>
+          <a:bodyPr>
+            <a:normAutofit/>
+          </a:bodyPr>
+          <a:lstStyle/>
+          <a:p>
+            <a:r>
+              <a:rPr lang="pt-BR" dirty="0"/>
+              <a:t>Desenvolvimento de aplicações no Arduino</a:t>
+            </a:r>
+            <a:br>
+              <a:rPr lang="pt-BR" dirty="0"/>
+            </a:br>
+            <a:r>
+              <a:rPr lang="pt-BR" sz="2200" dirty="0"/>
+              <a:t>DESENVOLVENDO O SOFTWARE PARA O ARDUINO</a:t>
+            </a:r>
+          </a:p>
+        </p:txBody>
+      </p:sp>
+    </p:spTree>
+    <p:extLst>
+      <p:ext uri="{BB962C8B-B14F-4D97-AF65-F5344CB8AC3E}">
+        <p14:creationId xmlns:p14="http://schemas.microsoft.com/office/powerpoint/2010/main" val="2106766124"/>
+      </p:ext>
+    </p:extLst>
+  </p:cSld>
+  <p:clrMapOvr>
+    <a:masterClrMapping/>
+  </p:clrMapOvr>
+</p:sld>
+</file>
+
+<file path=ppt/slides/slide26.xml><?xml version="1.0" encoding="utf-8"?>
 <p:sld xmlns:a="http://schemas.openxmlformats.org/drawingml/2006/main" xmlns:r="http://schemas.openxmlformats.org/officeDocument/2006/relationships" xmlns:p="http://schemas.openxmlformats.org/presentationml/2006/main">
   <p:cSld>
     <p:spTree>
@@ -9532,10 +10529,16 @@
             </a:r>
           </a:p>
           <a:p>
-            <a:endParaRPr lang="pt-BR" b="1" dirty="0"/>
-          </a:p>
-          <a:p>
-            <a:endParaRPr lang="pt-BR" b="1" dirty="0"/>
+            <a:r>
+              <a:rPr lang="pt-BR" b="1" dirty="0"/>
+              <a:t>Outras fontes</a:t>
+            </a:r>
+          </a:p>
+          <a:p>
+            <a:r>
+              <a:rPr lang="pt-BR" dirty="0"/>
+              <a:t>Apostila do curso</a:t>
+            </a:r>
           </a:p>
           <a:p>
             <a:endParaRPr lang="pt-BR" b="1" dirty="0"/>

</xml_diff>